<commit_message>
Update 기업업무 2강 과제(JavaScript 2) 남정현.pptx
</commit_message>
<xml_diff>
--- a/기업업무 과제/기업업무 2강 과제(JavaScript 2) 남정현.pptx
+++ b/기업업무 과제/기업업무 2강 과제(JavaScript 2) 남정현.pptx
@@ -23,15 +23,6 @@
     <p:sldId id="271" r:id="rId17"/>
     <p:sldId id="272" r:id="rId18"/>
     <p:sldId id="273" r:id="rId19"/>
-    <p:sldId id="274" r:id="rId20"/>
-    <p:sldId id="275" r:id="rId21"/>
-    <p:sldId id="276" r:id="rId22"/>
-    <p:sldId id="277" r:id="rId23"/>
-    <p:sldId id="278" r:id="rId24"/>
-    <p:sldId id="279" r:id="rId25"/>
-    <p:sldId id="280" r:id="rId26"/>
-    <p:sldId id="281" r:id="rId27"/>
-    <p:sldId id="282" r:id="rId28"/>
   </p:sldIdLst>
   <p:sldSz cx="12192000" cy="6858000"/>
   <p:notesSz cx="6858000" cy="9144000"/>
@@ -130,7 +121,588 @@
       </a:defRPr>
     </a:lvl9pPr>
   </p:defaultTextStyle>
+  <p:extLst>
+    <p:ext uri="{EFAFB233-063F-42B5-8137-9DF3F51BA10A}">
+      <p15:sldGuideLst xmlns:p15="http://schemas.microsoft.com/office/powerpoint/2012/main"/>
+    </p:ext>
+  </p:extLst>
 </p:presentation>
+</file>
+
+<file path=ppt/revisionInfo.xml><?xml version="1.0" encoding="utf-8"?>
+<p1510:revInfo xmlns:a="http://schemas.openxmlformats.org/drawingml/2006/main" xmlns:r="http://schemas.openxmlformats.org/officeDocument/2006/relationships" xmlns:p1510="http://schemas.microsoft.com/office/powerpoint/2015/10/main">
+  <p1510:revLst>
+    <p1510:client id="{4C1481EC-1602-4592-80C3-DF709AD9A43E}" v="10" dt="2023-05-18T14:41:40.002"/>
+  </p1510:revLst>
+</p1510:revInfo>
+</file>
+
+<file path=ppt/changesInfos/changesInfo1.xml><?xml version="1.0" encoding="utf-8"?>
+<pc:chgInfo xmlns:a="http://schemas.openxmlformats.org/drawingml/2006/main" xmlns:r="http://schemas.openxmlformats.org/officeDocument/2006/relationships" xmlns:ac="http://schemas.microsoft.com/office/drawing/2013/main/command" xmlns:pc="http://schemas.microsoft.com/office/powerpoint/2013/main/command">
+  <pc:docChgLst>
+    <pc:chgData name="남 정현" userId="42c87c46deb7f138" providerId="LiveId" clId="{4C1481EC-1602-4592-80C3-DF709AD9A43E}"/>
+    <pc:docChg chg="undo custSel delSld modSld">
+      <pc:chgData name="남 정현" userId="42c87c46deb7f138" providerId="LiveId" clId="{4C1481EC-1602-4592-80C3-DF709AD9A43E}" dt="2023-05-18T14:42:13.135" v="900" actId="2696"/>
+      <pc:docMkLst>
+        <pc:docMk/>
+      </pc:docMkLst>
+      <pc:sldChg chg="addSp modSp mod">
+        <pc:chgData name="남 정현" userId="42c87c46deb7f138" providerId="LiveId" clId="{4C1481EC-1602-4592-80C3-DF709AD9A43E}" dt="2023-05-18T14:10:29.457" v="8" actId="1076"/>
+        <pc:sldMkLst>
+          <pc:docMk/>
+          <pc:sldMk cId="3089877349" sldId="257"/>
+        </pc:sldMkLst>
+        <pc:picChg chg="add mod">
+          <ac:chgData name="남 정현" userId="42c87c46deb7f138" providerId="LiveId" clId="{4C1481EC-1602-4592-80C3-DF709AD9A43E}" dt="2023-05-18T14:10:03.515" v="4" actId="1076"/>
+          <ac:picMkLst>
+            <pc:docMk/>
+            <pc:sldMk cId="3089877349" sldId="257"/>
+            <ac:picMk id="4" creationId="{AB3D7F9E-C2FC-A7E4-D270-D0C4AAAFCBA2}"/>
+          </ac:picMkLst>
+        </pc:picChg>
+        <pc:picChg chg="add mod">
+          <ac:chgData name="남 정현" userId="42c87c46deb7f138" providerId="LiveId" clId="{4C1481EC-1602-4592-80C3-DF709AD9A43E}" dt="2023-05-18T14:10:15.610" v="6" actId="1076"/>
+          <ac:picMkLst>
+            <pc:docMk/>
+            <pc:sldMk cId="3089877349" sldId="257"/>
+            <ac:picMk id="6" creationId="{2073A3F9-2FAC-FD00-1995-F867286976ED}"/>
+          </ac:picMkLst>
+        </pc:picChg>
+        <pc:picChg chg="add mod">
+          <ac:chgData name="남 정현" userId="42c87c46deb7f138" providerId="LiveId" clId="{4C1481EC-1602-4592-80C3-DF709AD9A43E}" dt="2023-05-18T14:10:29.457" v="8" actId="1076"/>
+          <ac:picMkLst>
+            <pc:docMk/>
+            <pc:sldMk cId="3089877349" sldId="257"/>
+            <ac:picMk id="8" creationId="{3F91FBD8-3E55-A78E-6855-95ED18DC150D}"/>
+          </ac:picMkLst>
+        </pc:picChg>
+      </pc:sldChg>
+      <pc:sldChg chg="addSp modSp mod">
+        <pc:chgData name="남 정현" userId="42c87c46deb7f138" providerId="LiveId" clId="{4C1481EC-1602-4592-80C3-DF709AD9A43E}" dt="2023-05-18T14:11:53.297" v="17" actId="1076"/>
+        <pc:sldMkLst>
+          <pc:docMk/>
+          <pc:sldMk cId="4171192444" sldId="258"/>
+        </pc:sldMkLst>
+        <pc:spChg chg="mod">
+          <ac:chgData name="남 정현" userId="42c87c46deb7f138" providerId="LiveId" clId="{4C1481EC-1602-4592-80C3-DF709AD9A43E}" dt="2023-05-18T14:10:39.781" v="9" actId="20577"/>
+          <ac:spMkLst>
+            <pc:docMk/>
+            <pc:sldMk cId="4171192444" sldId="258"/>
+            <ac:spMk id="2" creationId="{00000000-0000-0000-0000-000000000000}"/>
+          </ac:spMkLst>
+        </pc:spChg>
+        <pc:picChg chg="add mod">
+          <ac:chgData name="남 정현" userId="42c87c46deb7f138" providerId="LiveId" clId="{4C1481EC-1602-4592-80C3-DF709AD9A43E}" dt="2023-05-18T14:11:13.659" v="13" actId="1076"/>
+          <ac:picMkLst>
+            <pc:docMk/>
+            <pc:sldMk cId="4171192444" sldId="258"/>
+            <ac:picMk id="4" creationId="{F3CB14B8-1A98-68C7-7D86-8428AC992B5D}"/>
+          </ac:picMkLst>
+        </pc:picChg>
+        <pc:picChg chg="add mod">
+          <ac:chgData name="남 정현" userId="42c87c46deb7f138" providerId="LiveId" clId="{4C1481EC-1602-4592-80C3-DF709AD9A43E}" dt="2023-05-18T14:11:40.343" v="15" actId="1076"/>
+          <ac:picMkLst>
+            <pc:docMk/>
+            <pc:sldMk cId="4171192444" sldId="258"/>
+            <ac:picMk id="6" creationId="{C2486566-D9EA-262E-51AB-4A6DBF1789E2}"/>
+          </ac:picMkLst>
+        </pc:picChg>
+        <pc:picChg chg="add mod">
+          <ac:chgData name="남 정현" userId="42c87c46deb7f138" providerId="LiveId" clId="{4C1481EC-1602-4592-80C3-DF709AD9A43E}" dt="2023-05-18T14:11:53.297" v="17" actId="1076"/>
+          <ac:picMkLst>
+            <pc:docMk/>
+            <pc:sldMk cId="4171192444" sldId="258"/>
+            <ac:picMk id="8" creationId="{17F580C3-907A-FC97-8230-274AAEF016D5}"/>
+          </ac:picMkLst>
+        </pc:picChg>
+      </pc:sldChg>
+      <pc:sldChg chg="addSp modSp mod">
+        <pc:chgData name="남 정현" userId="42c87c46deb7f138" providerId="LiveId" clId="{4C1481EC-1602-4592-80C3-DF709AD9A43E}" dt="2023-05-18T14:12:57.328" v="26" actId="1076"/>
+        <pc:sldMkLst>
+          <pc:docMk/>
+          <pc:sldMk cId="2115097485" sldId="259"/>
+        </pc:sldMkLst>
+        <pc:spChg chg="mod">
+          <ac:chgData name="남 정현" userId="42c87c46deb7f138" providerId="LiveId" clId="{4C1481EC-1602-4592-80C3-DF709AD9A43E}" dt="2023-05-18T14:12:18.908" v="20" actId="20577"/>
+          <ac:spMkLst>
+            <pc:docMk/>
+            <pc:sldMk cId="2115097485" sldId="259"/>
+            <ac:spMk id="2" creationId="{00000000-0000-0000-0000-000000000000}"/>
+          </ac:spMkLst>
+        </pc:spChg>
+        <pc:picChg chg="add mod">
+          <ac:chgData name="남 정현" userId="42c87c46deb7f138" providerId="LiveId" clId="{4C1481EC-1602-4592-80C3-DF709AD9A43E}" dt="2023-05-18T14:12:24.746" v="22" actId="1076"/>
+          <ac:picMkLst>
+            <pc:docMk/>
+            <pc:sldMk cId="2115097485" sldId="259"/>
+            <ac:picMk id="4" creationId="{10DF8957-2FCB-EA1B-DF7E-FC99D7419C83}"/>
+          </ac:picMkLst>
+        </pc:picChg>
+        <pc:picChg chg="add mod">
+          <ac:chgData name="남 정현" userId="42c87c46deb7f138" providerId="LiveId" clId="{4C1481EC-1602-4592-80C3-DF709AD9A43E}" dt="2023-05-18T14:12:44.629" v="24" actId="1076"/>
+          <ac:picMkLst>
+            <pc:docMk/>
+            <pc:sldMk cId="2115097485" sldId="259"/>
+            <ac:picMk id="6" creationId="{4DB34888-EE8E-5AB5-1972-7CD27B9083BF}"/>
+          </ac:picMkLst>
+        </pc:picChg>
+        <pc:picChg chg="add mod">
+          <ac:chgData name="남 정현" userId="42c87c46deb7f138" providerId="LiveId" clId="{4C1481EC-1602-4592-80C3-DF709AD9A43E}" dt="2023-05-18T14:12:57.328" v="26" actId="1076"/>
+          <ac:picMkLst>
+            <pc:docMk/>
+            <pc:sldMk cId="2115097485" sldId="259"/>
+            <ac:picMk id="8" creationId="{10E135A7-1A0F-9872-9298-CCFDF8DA0E9D}"/>
+          </ac:picMkLst>
+        </pc:picChg>
+      </pc:sldChg>
+      <pc:sldChg chg="addSp modSp mod">
+        <pc:chgData name="남 정현" userId="42c87c46deb7f138" providerId="LiveId" clId="{4C1481EC-1602-4592-80C3-DF709AD9A43E}" dt="2023-05-18T14:14:01.136" v="39" actId="1076"/>
+        <pc:sldMkLst>
+          <pc:docMk/>
+          <pc:sldMk cId="1331238384" sldId="260"/>
+        </pc:sldMkLst>
+        <pc:spChg chg="mod">
+          <ac:chgData name="남 정현" userId="42c87c46deb7f138" providerId="LiveId" clId="{4C1481EC-1602-4592-80C3-DF709AD9A43E}" dt="2023-05-18T14:13:07.278" v="28" actId="20577"/>
+          <ac:spMkLst>
+            <pc:docMk/>
+            <pc:sldMk cId="1331238384" sldId="260"/>
+            <ac:spMk id="2" creationId="{00000000-0000-0000-0000-000000000000}"/>
+          </ac:spMkLst>
+        </pc:spChg>
+        <pc:picChg chg="add mod">
+          <ac:chgData name="남 정현" userId="42c87c46deb7f138" providerId="LiveId" clId="{4C1481EC-1602-4592-80C3-DF709AD9A43E}" dt="2023-05-18T14:14:01.136" v="39" actId="1076"/>
+          <ac:picMkLst>
+            <pc:docMk/>
+            <pc:sldMk cId="1331238384" sldId="260"/>
+            <ac:picMk id="4" creationId="{2D143CEA-74B7-2B19-045D-CE99973F9053}"/>
+          </ac:picMkLst>
+        </pc:picChg>
+        <pc:picChg chg="add mod">
+          <ac:chgData name="남 정현" userId="42c87c46deb7f138" providerId="LiveId" clId="{4C1481EC-1602-4592-80C3-DF709AD9A43E}" dt="2023-05-18T14:13:58.213" v="38" actId="1076"/>
+          <ac:picMkLst>
+            <pc:docMk/>
+            <pc:sldMk cId="1331238384" sldId="260"/>
+            <ac:picMk id="6" creationId="{3FDDB9ED-557F-9581-4548-EDE7DD00A6E1}"/>
+          </ac:picMkLst>
+        </pc:picChg>
+        <pc:picChg chg="add mod">
+          <ac:chgData name="남 정현" userId="42c87c46deb7f138" providerId="LiveId" clId="{4C1481EC-1602-4592-80C3-DF709AD9A43E}" dt="2023-05-18T14:13:56.685" v="37" actId="1076"/>
+          <ac:picMkLst>
+            <pc:docMk/>
+            <pc:sldMk cId="1331238384" sldId="260"/>
+            <ac:picMk id="8" creationId="{4A8C23D8-E74A-B24C-9D07-3B2B8BDE7287}"/>
+          </ac:picMkLst>
+        </pc:picChg>
+      </pc:sldChg>
+      <pc:sldChg chg="addSp modSp mod">
+        <pc:chgData name="남 정현" userId="42c87c46deb7f138" providerId="LiveId" clId="{4C1481EC-1602-4592-80C3-DF709AD9A43E}" dt="2023-05-18T14:15:50.895" v="73" actId="1076"/>
+        <pc:sldMkLst>
+          <pc:docMk/>
+          <pc:sldMk cId="3849770734" sldId="261"/>
+        </pc:sldMkLst>
+        <pc:spChg chg="mod">
+          <ac:chgData name="남 정현" userId="42c87c46deb7f138" providerId="LiveId" clId="{4C1481EC-1602-4592-80C3-DF709AD9A43E}" dt="2023-05-18T14:15:00.479" v="42" actId="20577"/>
+          <ac:spMkLst>
+            <pc:docMk/>
+            <pc:sldMk cId="3849770734" sldId="261"/>
+            <ac:spMk id="2" creationId="{00000000-0000-0000-0000-000000000000}"/>
+          </ac:spMkLst>
+        </pc:spChg>
+        <pc:spChg chg="add mod">
+          <ac:chgData name="남 정현" userId="42c87c46deb7f138" providerId="LiveId" clId="{4C1481EC-1602-4592-80C3-DF709AD9A43E}" dt="2023-05-18T14:15:50.895" v="73" actId="1076"/>
+          <ac:spMkLst>
+            <pc:docMk/>
+            <pc:sldMk cId="3849770734" sldId="261"/>
+            <ac:spMk id="7" creationId="{5355FF44-2B68-D8CD-4357-39749DF5C6BA}"/>
+          </ac:spMkLst>
+        </pc:spChg>
+        <pc:picChg chg="add mod">
+          <ac:chgData name="남 정현" userId="42c87c46deb7f138" providerId="LiveId" clId="{4C1481EC-1602-4592-80C3-DF709AD9A43E}" dt="2023-05-18T14:15:06.558" v="44" actId="1076"/>
+          <ac:picMkLst>
+            <pc:docMk/>
+            <pc:sldMk cId="3849770734" sldId="261"/>
+            <ac:picMk id="4" creationId="{D921F462-CB6B-460C-4B3A-FB98A3E8DDEC}"/>
+          </ac:picMkLst>
+        </pc:picChg>
+        <pc:picChg chg="add mod">
+          <ac:chgData name="남 정현" userId="42c87c46deb7f138" providerId="LiveId" clId="{4C1481EC-1602-4592-80C3-DF709AD9A43E}" dt="2023-05-18T14:15:31.947" v="49" actId="1076"/>
+          <ac:picMkLst>
+            <pc:docMk/>
+            <pc:sldMk cId="3849770734" sldId="261"/>
+            <ac:picMk id="6" creationId="{1E16C46B-05B6-3F31-DAED-8BD80E94C2A0}"/>
+          </ac:picMkLst>
+        </pc:picChg>
+      </pc:sldChg>
+      <pc:sldChg chg="addSp delSp modSp mod">
+        <pc:chgData name="남 정현" userId="42c87c46deb7f138" providerId="LiveId" clId="{4C1481EC-1602-4592-80C3-DF709AD9A43E}" dt="2023-05-18T14:20:05.015" v="173" actId="20577"/>
+        <pc:sldMkLst>
+          <pc:docMk/>
+          <pc:sldMk cId="734135505" sldId="262"/>
+        </pc:sldMkLst>
+        <pc:spChg chg="mod">
+          <ac:chgData name="남 정현" userId="42c87c46deb7f138" providerId="LiveId" clId="{4C1481EC-1602-4592-80C3-DF709AD9A43E}" dt="2023-05-18T14:16:01.519" v="77" actId="20577"/>
+          <ac:spMkLst>
+            <pc:docMk/>
+            <pc:sldMk cId="734135505" sldId="262"/>
+            <ac:spMk id="2" creationId="{00000000-0000-0000-0000-000000000000}"/>
+          </ac:spMkLst>
+        </pc:spChg>
+        <pc:spChg chg="add del mod">
+          <ac:chgData name="남 정현" userId="42c87c46deb7f138" providerId="LiveId" clId="{4C1481EC-1602-4592-80C3-DF709AD9A43E}" dt="2023-05-18T14:15:58.694" v="75"/>
+          <ac:spMkLst>
+            <pc:docMk/>
+            <pc:sldMk cId="734135505" sldId="262"/>
+            <ac:spMk id="3" creationId="{8D952AB8-0E7F-BEF4-1C07-EC37B91836DB}"/>
+          </ac:spMkLst>
+        </pc:spChg>
+        <pc:spChg chg="add mod">
+          <ac:chgData name="남 정현" userId="42c87c46deb7f138" providerId="LiveId" clId="{4C1481EC-1602-4592-80C3-DF709AD9A43E}" dt="2023-05-18T14:19:50.884" v="168" actId="1076"/>
+          <ac:spMkLst>
+            <pc:docMk/>
+            <pc:sldMk cId="734135505" sldId="262"/>
+            <ac:spMk id="8" creationId="{89BB9A3A-7450-2B2D-BA7E-7BC26BC7F2E1}"/>
+          </ac:spMkLst>
+        </pc:spChg>
+        <pc:spChg chg="add mod">
+          <ac:chgData name="남 정현" userId="42c87c46deb7f138" providerId="LiveId" clId="{4C1481EC-1602-4592-80C3-DF709AD9A43E}" dt="2023-05-18T14:20:05.015" v="173" actId="20577"/>
+          <ac:spMkLst>
+            <pc:docMk/>
+            <pc:sldMk cId="734135505" sldId="262"/>
+            <ac:spMk id="9" creationId="{8D7DA627-BF0E-DA6E-EA76-1E6190242FD0}"/>
+          </ac:spMkLst>
+        </pc:spChg>
+        <pc:picChg chg="add mod">
+          <ac:chgData name="남 정현" userId="42c87c46deb7f138" providerId="LiveId" clId="{4C1481EC-1602-4592-80C3-DF709AD9A43E}" dt="2023-05-18T14:18:48.564" v="82" actId="14100"/>
+          <ac:picMkLst>
+            <pc:docMk/>
+            <pc:sldMk cId="734135505" sldId="262"/>
+            <ac:picMk id="5" creationId="{D9EB365F-8BC7-B2A2-63D0-AE813D12FEE9}"/>
+          </ac:picMkLst>
+        </pc:picChg>
+        <pc:picChg chg="add mod">
+          <ac:chgData name="남 정현" userId="42c87c46deb7f138" providerId="LiveId" clId="{4C1481EC-1602-4592-80C3-DF709AD9A43E}" dt="2023-05-18T14:18:45.498" v="81" actId="1076"/>
+          <ac:picMkLst>
+            <pc:docMk/>
+            <pc:sldMk cId="734135505" sldId="262"/>
+            <ac:picMk id="7" creationId="{1C8668C1-6F08-F2B2-619E-2179420D880D}"/>
+          </ac:picMkLst>
+        </pc:picChg>
+      </pc:sldChg>
+      <pc:sldChg chg="addSp modSp mod">
+        <pc:chgData name="남 정현" userId="42c87c46deb7f138" providerId="LiveId" clId="{4C1481EC-1602-4592-80C3-DF709AD9A43E}" dt="2023-05-18T14:21:22.348" v="181" actId="1076"/>
+        <pc:sldMkLst>
+          <pc:docMk/>
+          <pc:sldMk cId="501199751" sldId="263"/>
+        </pc:sldMkLst>
+        <pc:spChg chg="mod">
+          <ac:chgData name="남 정현" userId="42c87c46deb7f138" providerId="LiveId" clId="{4C1481EC-1602-4592-80C3-DF709AD9A43E}" dt="2023-05-18T14:21:02.145" v="179" actId="20577"/>
+          <ac:spMkLst>
+            <pc:docMk/>
+            <pc:sldMk cId="501199751" sldId="263"/>
+            <ac:spMk id="2" creationId="{00000000-0000-0000-0000-000000000000}"/>
+          </ac:spMkLst>
+        </pc:spChg>
+        <pc:picChg chg="add mod">
+          <ac:chgData name="남 정현" userId="42c87c46deb7f138" providerId="LiveId" clId="{4C1481EC-1602-4592-80C3-DF709AD9A43E}" dt="2023-05-18T14:20:59.667" v="177" actId="1076"/>
+          <ac:picMkLst>
+            <pc:docMk/>
+            <pc:sldMk cId="501199751" sldId="263"/>
+            <ac:picMk id="4" creationId="{CF215C3F-C8BD-0D6D-B097-93A30B3E94A3}"/>
+          </ac:picMkLst>
+        </pc:picChg>
+        <pc:picChg chg="add mod">
+          <ac:chgData name="남 정현" userId="42c87c46deb7f138" providerId="LiveId" clId="{4C1481EC-1602-4592-80C3-DF709AD9A43E}" dt="2023-05-18T14:21:22.348" v="181" actId="1076"/>
+          <ac:picMkLst>
+            <pc:docMk/>
+            <pc:sldMk cId="501199751" sldId="263"/>
+            <ac:picMk id="6" creationId="{8893EB43-7C74-CDDF-909B-CC9E167697BF}"/>
+          </ac:picMkLst>
+        </pc:picChg>
+      </pc:sldChg>
+      <pc:sldChg chg="addSp modSp mod">
+        <pc:chgData name="남 정현" userId="42c87c46deb7f138" providerId="LiveId" clId="{4C1481EC-1602-4592-80C3-DF709AD9A43E}" dt="2023-05-18T14:26:44.486" v="316" actId="1076"/>
+        <pc:sldMkLst>
+          <pc:docMk/>
+          <pc:sldMk cId="2951200691" sldId="264"/>
+        </pc:sldMkLst>
+        <pc:spChg chg="mod">
+          <ac:chgData name="남 정현" userId="42c87c46deb7f138" providerId="LiveId" clId="{4C1481EC-1602-4592-80C3-DF709AD9A43E}" dt="2023-05-18T14:21:26.014" v="182"/>
+          <ac:spMkLst>
+            <pc:docMk/>
+            <pc:sldMk cId="2951200691" sldId="264"/>
+            <ac:spMk id="2" creationId="{00000000-0000-0000-0000-000000000000}"/>
+          </ac:spMkLst>
+        </pc:spChg>
+        <pc:spChg chg="add mod">
+          <ac:chgData name="남 정현" userId="42c87c46deb7f138" providerId="LiveId" clId="{4C1481EC-1602-4592-80C3-DF709AD9A43E}" dt="2023-05-18T14:26:44.486" v="316" actId="1076"/>
+          <ac:spMkLst>
+            <pc:docMk/>
+            <pc:sldMk cId="2951200691" sldId="264"/>
+            <ac:spMk id="5" creationId="{05D38FFD-CFE2-4F52-69DC-80D2A5EFDB79}"/>
+          </ac:spMkLst>
+        </pc:spChg>
+        <pc:picChg chg="add mod">
+          <ac:chgData name="남 정현" userId="42c87c46deb7f138" providerId="LiveId" clId="{4C1481EC-1602-4592-80C3-DF709AD9A43E}" dt="2023-05-18T14:21:41.587" v="186" actId="1076"/>
+          <ac:picMkLst>
+            <pc:docMk/>
+            <pc:sldMk cId="2951200691" sldId="264"/>
+            <ac:picMk id="4" creationId="{22F59EDD-889A-8EBA-4A4F-9DCA5104A1C2}"/>
+          </ac:picMkLst>
+        </pc:picChg>
+      </pc:sldChg>
+      <pc:sldChg chg="addSp modSp mod">
+        <pc:chgData name="남 정현" userId="42c87c46deb7f138" providerId="LiveId" clId="{4C1481EC-1602-4592-80C3-DF709AD9A43E}" dt="2023-05-18T14:27:39.196" v="325" actId="1076"/>
+        <pc:sldMkLst>
+          <pc:docMk/>
+          <pc:sldMk cId="589360552" sldId="265"/>
+        </pc:sldMkLst>
+        <pc:spChg chg="mod">
+          <ac:chgData name="남 정현" userId="42c87c46deb7f138" providerId="LiveId" clId="{4C1481EC-1602-4592-80C3-DF709AD9A43E}" dt="2023-05-18T14:27:16.148" v="323" actId="20577"/>
+          <ac:spMkLst>
+            <pc:docMk/>
+            <pc:sldMk cId="589360552" sldId="265"/>
+            <ac:spMk id="2" creationId="{00000000-0000-0000-0000-000000000000}"/>
+          </ac:spMkLst>
+        </pc:spChg>
+        <pc:picChg chg="add mod">
+          <ac:chgData name="남 정현" userId="42c87c46deb7f138" providerId="LiveId" clId="{4C1481EC-1602-4592-80C3-DF709AD9A43E}" dt="2023-05-18T14:27:13.648" v="321" actId="1076"/>
+          <ac:picMkLst>
+            <pc:docMk/>
+            <pc:sldMk cId="589360552" sldId="265"/>
+            <ac:picMk id="4" creationId="{52CF0EE5-9930-C83F-5D1E-B8F954BD50B7}"/>
+          </ac:picMkLst>
+        </pc:picChg>
+        <pc:picChg chg="add mod">
+          <ac:chgData name="남 정현" userId="42c87c46deb7f138" providerId="LiveId" clId="{4C1481EC-1602-4592-80C3-DF709AD9A43E}" dt="2023-05-18T14:27:39.196" v="325" actId="1076"/>
+          <ac:picMkLst>
+            <pc:docMk/>
+            <pc:sldMk cId="589360552" sldId="265"/>
+            <ac:picMk id="6" creationId="{1675F258-4860-A13E-2AFA-D1361ED746CB}"/>
+          </ac:picMkLst>
+        </pc:picChg>
+      </pc:sldChg>
+      <pc:sldChg chg="addSp delSp modSp mod">
+        <pc:chgData name="남 정현" userId="42c87c46deb7f138" providerId="LiveId" clId="{4C1481EC-1602-4592-80C3-DF709AD9A43E}" dt="2023-05-18T14:29:49.055" v="541" actId="20577"/>
+        <pc:sldMkLst>
+          <pc:docMk/>
+          <pc:sldMk cId="4202841287" sldId="266"/>
+        </pc:sldMkLst>
+        <pc:spChg chg="mod">
+          <ac:chgData name="남 정현" userId="42c87c46deb7f138" providerId="LiveId" clId="{4C1481EC-1602-4592-80C3-DF709AD9A43E}" dt="2023-05-18T14:27:44.072" v="326"/>
+          <ac:spMkLst>
+            <pc:docMk/>
+            <pc:sldMk cId="4202841287" sldId="266"/>
+            <ac:spMk id="2" creationId="{00000000-0000-0000-0000-000000000000}"/>
+          </ac:spMkLst>
+        </pc:spChg>
+        <pc:spChg chg="add mod">
+          <ac:chgData name="남 정현" userId="42c87c46deb7f138" providerId="LiveId" clId="{4C1481EC-1602-4592-80C3-DF709AD9A43E}" dt="2023-05-18T14:29:49.055" v="541" actId="20577"/>
+          <ac:spMkLst>
+            <pc:docMk/>
+            <pc:sldMk cId="4202841287" sldId="266"/>
+            <ac:spMk id="7" creationId="{E125A681-723B-69CD-421B-FEB3E6C01140}"/>
+          </ac:spMkLst>
+        </pc:spChg>
+        <pc:picChg chg="add mod">
+          <ac:chgData name="남 정현" userId="42c87c46deb7f138" providerId="LiveId" clId="{4C1481EC-1602-4592-80C3-DF709AD9A43E}" dt="2023-05-18T14:29:04.224" v="439" actId="1076"/>
+          <ac:picMkLst>
+            <pc:docMk/>
+            <pc:sldMk cId="4202841287" sldId="266"/>
+            <ac:picMk id="4" creationId="{7771A2B1-D6BC-736E-E7A4-65C9F8305F00}"/>
+          </ac:picMkLst>
+        </pc:picChg>
+        <pc:picChg chg="add del">
+          <ac:chgData name="남 정현" userId="42c87c46deb7f138" providerId="LiveId" clId="{4C1481EC-1602-4592-80C3-DF709AD9A43E}" dt="2023-05-18T14:28:29.346" v="333" actId="22"/>
+          <ac:picMkLst>
+            <pc:docMk/>
+            <pc:sldMk cId="4202841287" sldId="266"/>
+            <ac:picMk id="6" creationId="{1DF93EAE-6B19-83B9-7362-4300B643B6E5}"/>
+          </ac:picMkLst>
+        </pc:picChg>
+      </pc:sldChg>
+      <pc:sldChg chg="addSp modSp mod">
+        <pc:chgData name="남 정현" userId="42c87c46deb7f138" providerId="LiveId" clId="{4C1481EC-1602-4592-80C3-DF709AD9A43E}" dt="2023-05-18T14:31:38.368" v="755" actId="1076"/>
+        <pc:sldMkLst>
+          <pc:docMk/>
+          <pc:sldMk cId="87313276" sldId="267"/>
+        </pc:sldMkLst>
+        <pc:spChg chg="mod">
+          <ac:chgData name="남 정현" userId="42c87c46deb7f138" providerId="LiveId" clId="{4C1481EC-1602-4592-80C3-DF709AD9A43E}" dt="2023-05-18T14:27:49.712" v="329"/>
+          <ac:spMkLst>
+            <pc:docMk/>
+            <pc:sldMk cId="87313276" sldId="267"/>
+            <ac:spMk id="2" creationId="{00000000-0000-0000-0000-000000000000}"/>
+          </ac:spMkLst>
+        </pc:spChg>
+        <pc:spChg chg="add mod">
+          <ac:chgData name="남 정현" userId="42c87c46deb7f138" providerId="LiveId" clId="{4C1481EC-1602-4592-80C3-DF709AD9A43E}" dt="2023-05-18T14:31:38.368" v="755" actId="1076"/>
+          <ac:spMkLst>
+            <pc:docMk/>
+            <pc:sldMk cId="87313276" sldId="267"/>
+            <ac:spMk id="7" creationId="{FADB3A80-8FAC-C208-4C90-BCE2C04EAE3C}"/>
+          </ac:spMkLst>
+        </pc:spChg>
+        <pc:picChg chg="add mod">
+          <ac:chgData name="남 정현" userId="42c87c46deb7f138" providerId="LiveId" clId="{4C1481EC-1602-4592-80C3-DF709AD9A43E}" dt="2023-05-18T14:30:14.139" v="544" actId="1076"/>
+          <ac:picMkLst>
+            <pc:docMk/>
+            <pc:sldMk cId="87313276" sldId="267"/>
+            <ac:picMk id="4" creationId="{2273849A-3FFF-5FB5-0CBA-6FEA465ECC8E}"/>
+          </ac:picMkLst>
+        </pc:picChg>
+        <pc:picChg chg="add mod">
+          <ac:chgData name="남 정현" userId="42c87c46deb7f138" providerId="LiveId" clId="{4C1481EC-1602-4592-80C3-DF709AD9A43E}" dt="2023-05-18T14:30:27.500" v="546" actId="1076"/>
+          <ac:picMkLst>
+            <pc:docMk/>
+            <pc:sldMk cId="87313276" sldId="267"/>
+            <ac:picMk id="6" creationId="{E97D1682-8890-267B-4632-422EEED7AB51}"/>
+          </ac:picMkLst>
+        </pc:picChg>
+      </pc:sldChg>
+      <pc:sldChg chg="addSp modSp mod">
+        <pc:chgData name="남 정현" userId="42c87c46deb7f138" providerId="LiveId" clId="{4C1481EC-1602-4592-80C3-DF709AD9A43E}" dt="2023-05-18T14:32:32.490" v="763" actId="1076"/>
+        <pc:sldMkLst>
+          <pc:docMk/>
+          <pc:sldMk cId="3255604648" sldId="268"/>
+        </pc:sldMkLst>
+        <pc:spChg chg="mod">
+          <ac:chgData name="남 정현" userId="42c87c46deb7f138" providerId="LiveId" clId="{4C1481EC-1602-4592-80C3-DF709AD9A43E}" dt="2023-05-18T14:32:14.381" v="760" actId="20577"/>
+          <ac:spMkLst>
+            <pc:docMk/>
+            <pc:sldMk cId="3255604648" sldId="268"/>
+            <ac:spMk id="2" creationId="{00000000-0000-0000-0000-000000000000}"/>
+          </ac:spMkLst>
+        </pc:spChg>
+        <pc:picChg chg="add mod">
+          <ac:chgData name="남 정현" userId="42c87c46deb7f138" providerId="LiveId" clId="{4C1481EC-1602-4592-80C3-DF709AD9A43E}" dt="2023-05-18T14:32:12.034" v="758" actId="1076"/>
+          <ac:picMkLst>
+            <pc:docMk/>
+            <pc:sldMk cId="3255604648" sldId="268"/>
+            <ac:picMk id="4" creationId="{6AA74554-5935-A700-97AC-EBF29E05BC00}"/>
+          </ac:picMkLst>
+        </pc:picChg>
+        <pc:picChg chg="add mod">
+          <ac:chgData name="남 정현" userId="42c87c46deb7f138" providerId="LiveId" clId="{4C1481EC-1602-4592-80C3-DF709AD9A43E}" dt="2023-05-18T14:32:32.490" v="763" actId="1076"/>
+          <ac:picMkLst>
+            <pc:docMk/>
+            <pc:sldMk cId="3255604648" sldId="268"/>
+            <ac:picMk id="6" creationId="{3F8EC064-0477-E5D6-9258-AEA3D747C777}"/>
+          </ac:picMkLst>
+        </pc:picChg>
+      </pc:sldChg>
+      <pc:sldChg chg="addSp modSp mod">
+        <pc:chgData name="남 정현" userId="42c87c46deb7f138" providerId="LiveId" clId="{4C1481EC-1602-4592-80C3-DF709AD9A43E}" dt="2023-05-18T14:42:00.590" v="899" actId="1076"/>
+        <pc:sldMkLst>
+          <pc:docMk/>
+          <pc:sldMk cId="4039381614" sldId="269"/>
+        </pc:sldMkLst>
+        <pc:spChg chg="mod">
+          <ac:chgData name="남 정현" userId="42c87c46deb7f138" providerId="LiveId" clId="{4C1481EC-1602-4592-80C3-DF709AD9A43E}" dt="2023-05-18T14:32:35.859" v="764"/>
+          <ac:spMkLst>
+            <pc:docMk/>
+            <pc:sldMk cId="4039381614" sldId="269"/>
+            <ac:spMk id="2" creationId="{00000000-0000-0000-0000-000000000000}"/>
+          </ac:spMkLst>
+        </pc:spChg>
+        <pc:spChg chg="add mod">
+          <ac:chgData name="남 정현" userId="42c87c46deb7f138" providerId="LiveId" clId="{4C1481EC-1602-4592-80C3-DF709AD9A43E}" dt="2023-05-18T14:41:14.262" v="873" actId="1076"/>
+          <ac:spMkLst>
+            <pc:docMk/>
+            <pc:sldMk cId="4039381614" sldId="269"/>
+            <ac:spMk id="5" creationId="{A3BDEAF5-FED2-19EA-A779-28F986002C07}"/>
+          </ac:spMkLst>
+        </pc:spChg>
+        <pc:spChg chg="add mod">
+          <ac:chgData name="남 정현" userId="42c87c46deb7f138" providerId="LiveId" clId="{4C1481EC-1602-4592-80C3-DF709AD9A43E}" dt="2023-05-18T14:42:00.590" v="899" actId="1076"/>
+          <ac:spMkLst>
+            <pc:docMk/>
+            <pc:sldMk cId="4039381614" sldId="269"/>
+            <ac:spMk id="8" creationId="{FF4FC32C-779F-523F-5031-98D9570DC004}"/>
+          </ac:spMkLst>
+        </pc:spChg>
+        <pc:picChg chg="add mod">
+          <ac:chgData name="남 정현" userId="42c87c46deb7f138" providerId="LiveId" clId="{4C1481EC-1602-4592-80C3-DF709AD9A43E}" dt="2023-05-18T14:41:16.373" v="874" actId="1076"/>
+          <ac:picMkLst>
+            <pc:docMk/>
+            <pc:sldMk cId="4039381614" sldId="269"/>
+            <ac:picMk id="4" creationId="{AB98C994-85D6-8FF8-317A-996D26DF9A1E}"/>
+          </ac:picMkLst>
+        </pc:picChg>
+        <pc:picChg chg="add mod">
+          <ac:chgData name="남 정현" userId="42c87c46deb7f138" providerId="LiveId" clId="{4C1481EC-1602-4592-80C3-DF709AD9A43E}" dt="2023-05-18T14:41:37.829" v="879" actId="1076"/>
+          <ac:picMkLst>
+            <pc:docMk/>
+            <pc:sldMk cId="4039381614" sldId="269"/>
+            <ac:picMk id="7" creationId="{D381B40B-3C54-712B-9FA7-8EC9A9135361}"/>
+          </ac:picMkLst>
+        </pc:picChg>
+      </pc:sldChg>
+      <pc:sldChg chg="del">
+        <pc:chgData name="남 정현" userId="42c87c46deb7f138" providerId="LiveId" clId="{4C1481EC-1602-4592-80C3-DF709AD9A43E}" dt="2023-05-18T14:42:13.135" v="900" actId="2696"/>
+        <pc:sldMkLst>
+          <pc:docMk/>
+          <pc:sldMk cId="1546396440" sldId="274"/>
+        </pc:sldMkLst>
+      </pc:sldChg>
+      <pc:sldChg chg="del">
+        <pc:chgData name="남 정현" userId="42c87c46deb7f138" providerId="LiveId" clId="{4C1481EC-1602-4592-80C3-DF709AD9A43E}" dt="2023-05-18T14:42:13.135" v="900" actId="2696"/>
+        <pc:sldMkLst>
+          <pc:docMk/>
+          <pc:sldMk cId="3166858389" sldId="275"/>
+        </pc:sldMkLst>
+      </pc:sldChg>
+      <pc:sldChg chg="del">
+        <pc:chgData name="남 정현" userId="42c87c46deb7f138" providerId="LiveId" clId="{4C1481EC-1602-4592-80C3-DF709AD9A43E}" dt="2023-05-18T14:42:13.135" v="900" actId="2696"/>
+        <pc:sldMkLst>
+          <pc:docMk/>
+          <pc:sldMk cId="1483215720" sldId="276"/>
+        </pc:sldMkLst>
+      </pc:sldChg>
+      <pc:sldChg chg="del">
+        <pc:chgData name="남 정현" userId="42c87c46deb7f138" providerId="LiveId" clId="{4C1481EC-1602-4592-80C3-DF709AD9A43E}" dt="2023-05-18T14:42:13.135" v="900" actId="2696"/>
+        <pc:sldMkLst>
+          <pc:docMk/>
+          <pc:sldMk cId="1109592946" sldId="277"/>
+        </pc:sldMkLst>
+      </pc:sldChg>
+      <pc:sldChg chg="del">
+        <pc:chgData name="남 정현" userId="42c87c46deb7f138" providerId="LiveId" clId="{4C1481EC-1602-4592-80C3-DF709AD9A43E}" dt="2023-05-18T14:42:13.135" v="900" actId="2696"/>
+        <pc:sldMkLst>
+          <pc:docMk/>
+          <pc:sldMk cId="4092244528" sldId="278"/>
+        </pc:sldMkLst>
+      </pc:sldChg>
+      <pc:sldChg chg="del">
+        <pc:chgData name="남 정현" userId="42c87c46deb7f138" providerId="LiveId" clId="{4C1481EC-1602-4592-80C3-DF709AD9A43E}" dt="2023-05-18T14:42:13.135" v="900" actId="2696"/>
+        <pc:sldMkLst>
+          <pc:docMk/>
+          <pc:sldMk cId="3218084244" sldId="279"/>
+        </pc:sldMkLst>
+      </pc:sldChg>
+      <pc:sldChg chg="del">
+        <pc:chgData name="남 정현" userId="42c87c46deb7f138" providerId="LiveId" clId="{4C1481EC-1602-4592-80C3-DF709AD9A43E}" dt="2023-05-18T14:42:13.135" v="900" actId="2696"/>
+        <pc:sldMkLst>
+          <pc:docMk/>
+          <pc:sldMk cId="2424372319" sldId="280"/>
+        </pc:sldMkLst>
+      </pc:sldChg>
+      <pc:sldChg chg="del">
+        <pc:chgData name="남 정현" userId="42c87c46deb7f138" providerId="LiveId" clId="{4C1481EC-1602-4592-80C3-DF709AD9A43E}" dt="2023-05-18T14:42:13.135" v="900" actId="2696"/>
+        <pc:sldMkLst>
+          <pc:docMk/>
+          <pc:sldMk cId="2747862642" sldId="281"/>
+        </pc:sldMkLst>
+      </pc:sldChg>
+      <pc:sldChg chg="del">
+        <pc:chgData name="남 정현" userId="42c87c46deb7f138" providerId="LiveId" clId="{4C1481EC-1602-4592-80C3-DF709AD9A43E}" dt="2023-05-18T14:42:13.135" v="900" actId="2696"/>
+        <pc:sldMkLst>
+          <pc:docMk/>
+          <pc:sldMk cId="1966062502" sldId="282"/>
+        </pc:sldMkLst>
+      </pc:sldChg>
+    </pc:docChg>
+  </pc:docChgLst>
+</pc:chgInfo>
 </file>
 
 <file path=ppt/slideLayouts/slideLayout1.xml><?xml version="1.0" encoding="utf-8"?>
@@ -189,7 +761,7 @@
           </a:lstStyle>
           <a:p>
             <a:r>
-              <a:rPr lang="ko-KR" altLang="en-US" smtClean="0"/>
+              <a:rPr lang="ko-KR" altLang="en-US"/>
               <a:t>마스터 제목 스타일 편집</a:t>
             </a:r>
             <a:endParaRPr lang="en-US" dirty="0"/>
@@ -265,7 +837,7 @@
           </a:lstStyle>
           <a:p>
             <a:r>
-              <a:rPr lang="ko-KR" altLang="en-US" smtClean="0"/>
+              <a:rPr lang="ko-KR" altLang="en-US"/>
               <a:t>마스터 부제목 스타일 편집</a:t>
             </a:r>
             <a:endParaRPr lang="en-US" dirty="0"/>
@@ -548,7 +1120,7 @@
           <a:lstStyle/>
           <a:p>
             <a:r>
-              <a:rPr lang="ko-KR" altLang="en-US" smtClean="0"/>
+              <a:rPr lang="ko-KR" altLang="en-US"/>
               <a:t>마스터 제목 스타일 편집</a:t>
             </a:r>
             <a:endParaRPr lang="en-US" dirty="0"/>
@@ -577,35 +1149,35 @@
           <a:p>
             <a:pPr lvl="0"/>
             <a:r>
-              <a:rPr lang="ko-KR" altLang="en-US" smtClean="0"/>
+              <a:rPr lang="ko-KR" altLang="en-US"/>
               <a:t>마스터 텍스트 스타일을 편집합니다</a:t>
             </a:r>
           </a:p>
           <a:p>
             <a:pPr lvl="1"/>
             <a:r>
-              <a:rPr lang="ko-KR" altLang="en-US" smtClean="0"/>
+              <a:rPr lang="ko-KR" altLang="en-US"/>
               <a:t>둘째 수준</a:t>
             </a:r>
           </a:p>
           <a:p>
             <a:pPr lvl="2"/>
             <a:r>
-              <a:rPr lang="ko-KR" altLang="en-US" smtClean="0"/>
+              <a:rPr lang="ko-KR" altLang="en-US"/>
               <a:t>셋째 수준</a:t>
             </a:r>
           </a:p>
           <a:p>
             <a:pPr lvl="3"/>
             <a:r>
-              <a:rPr lang="ko-KR" altLang="en-US" smtClean="0"/>
+              <a:rPr lang="ko-KR" altLang="en-US"/>
               <a:t>넷째 수준</a:t>
             </a:r>
           </a:p>
           <a:p>
             <a:pPr lvl="4"/>
             <a:r>
-              <a:rPr lang="ko-KR" altLang="en-US" smtClean="0"/>
+              <a:rPr lang="ko-KR" altLang="en-US"/>
               <a:t>다섯째 수준</a:t>
             </a:r>
             <a:endParaRPr lang="en-US" dirty="0"/>
@@ -723,7 +1295,7 @@
           <a:lstStyle/>
           <a:p>
             <a:r>
-              <a:rPr lang="ko-KR" altLang="en-US" smtClean="0"/>
+              <a:rPr lang="ko-KR" altLang="en-US"/>
               <a:t>마스터 제목 스타일 편집</a:t>
             </a:r>
             <a:endParaRPr lang="en-US" dirty="0"/>
@@ -752,35 +1324,35 @@
           <a:p>
             <a:pPr lvl="0"/>
             <a:r>
-              <a:rPr lang="ko-KR" altLang="en-US" smtClean="0"/>
+              <a:rPr lang="ko-KR" altLang="en-US"/>
               <a:t>마스터 텍스트 스타일을 편집합니다</a:t>
             </a:r>
           </a:p>
           <a:p>
             <a:pPr lvl="1"/>
             <a:r>
-              <a:rPr lang="ko-KR" altLang="en-US" smtClean="0"/>
+              <a:rPr lang="ko-KR" altLang="en-US"/>
               <a:t>둘째 수준</a:t>
             </a:r>
           </a:p>
           <a:p>
             <a:pPr lvl="2"/>
             <a:r>
-              <a:rPr lang="ko-KR" altLang="en-US" smtClean="0"/>
+              <a:rPr lang="ko-KR" altLang="en-US"/>
               <a:t>셋째 수준</a:t>
             </a:r>
           </a:p>
           <a:p>
             <a:pPr lvl="3"/>
             <a:r>
-              <a:rPr lang="ko-KR" altLang="en-US" smtClean="0"/>
+              <a:rPr lang="ko-KR" altLang="en-US"/>
               <a:t>넷째 수준</a:t>
             </a:r>
           </a:p>
           <a:p>
             <a:pPr lvl="4"/>
             <a:r>
-              <a:rPr lang="ko-KR" altLang="en-US" smtClean="0"/>
+              <a:rPr lang="ko-KR" altLang="en-US"/>
               <a:t>다섯째 수준</a:t>
             </a:r>
             <a:endParaRPr lang="en-US" dirty="0"/>
@@ -893,7 +1465,7 @@
           <a:lstStyle/>
           <a:p>
             <a:r>
-              <a:rPr lang="ko-KR" altLang="en-US" smtClean="0"/>
+              <a:rPr lang="ko-KR" altLang="en-US"/>
               <a:t>마스터 제목 스타일 편집</a:t>
             </a:r>
             <a:endParaRPr lang="en-US" dirty="0"/>
@@ -917,35 +1489,35 @@
           <a:p>
             <a:pPr lvl="0"/>
             <a:r>
-              <a:rPr lang="ko-KR" altLang="en-US" smtClean="0"/>
+              <a:rPr lang="ko-KR" altLang="en-US"/>
               <a:t>마스터 텍스트 스타일을 편집합니다</a:t>
             </a:r>
           </a:p>
           <a:p>
             <a:pPr lvl="1"/>
             <a:r>
-              <a:rPr lang="ko-KR" altLang="en-US" smtClean="0"/>
+              <a:rPr lang="ko-KR" altLang="en-US"/>
               <a:t>둘째 수준</a:t>
             </a:r>
           </a:p>
           <a:p>
             <a:pPr lvl="2"/>
             <a:r>
-              <a:rPr lang="ko-KR" altLang="en-US" smtClean="0"/>
+              <a:rPr lang="ko-KR" altLang="en-US"/>
               <a:t>셋째 수준</a:t>
             </a:r>
           </a:p>
           <a:p>
             <a:pPr lvl="3"/>
             <a:r>
-              <a:rPr lang="ko-KR" altLang="en-US" smtClean="0"/>
+              <a:rPr lang="ko-KR" altLang="en-US"/>
               <a:t>넷째 수준</a:t>
             </a:r>
           </a:p>
           <a:p>
             <a:pPr lvl="4"/>
             <a:r>
-              <a:rPr lang="ko-KR" altLang="en-US" smtClean="0"/>
+              <a:rPr lang="ko-KR" altLang="en-US"/>
               <a:t>다섯째 수준</a:t>
             </a:r>
             <a:endParaRPr lang="en-US" dirty="0"/>
@@ -1078,7 +1650,7 @@
           </a:lstStyle>
           <a:p>
             <a:r>
-              <a:rPr lang="ko-KR" altLang="en-US" smtClean="0"/>
+              <a:rPr lang="ko-KR" altLang="en-US"/>
               <a:t>마스터 제목 스타일 편집</a:t>
             </a:r>
             <a:endParaRPr lang="en-US" dirty="0"/>
@@ -1205,7 +1777,7 @@
           <a:p>
             <a:pPr lvl="0"/>
             <a:r>
-              <a:rPr lang="ko-KR" altLang="en-US" smtClean="0"/>
+              <a:rPr lang="ko-KR" altLang="en-US"/>
               <a:t>마스터 텍스트 스타일을 편집합니다</a:t>
             </a:r>
           </a:p>
@@ -1422,7 +1994,7 @@
           </a:lstStyle>
           <a:p>
             <a:r>
-              <a:rPr lang="ko-KR" altLang="en-US" smtClean="0"/>
+              <a:rPr lang="ko-KR" altLang="en-US"/>
               <a:t>마스터 제목 스타일 편집</a:t>
             </a:r>
             <a:endParaRPr lang="en-US" dirty="0"/>
@@ -1487,35 +2059,35 @@
           <a:p>
             <a:pPr lvl="0"/>
             <a:r>
-              <a:rPr lang="ko-KR" altLang="en-US" smtClean="0"/>
+              <a:rPr lang="ko-KR" altLang="en-US"/>
               <a:t>마스터 텍스트 스타일을 편집합니다</a:t>
             </a:r>
           </a:p>
           <a:p>
             <a:pPr lvl="1"/>
             <a:r>
-              <a:rPr lang="ko-KR" altLang="en-US" smtClean="0"/>
+              <a:rPr lang="ko-KR" altLang="en-US"/>
               <a:t>둘째 수준</a:t>
             </a:r>
           </a:p>
           <a:p>
             <a:pPr lvl="2"/>
             <a:r>
-              <a:rPr lang="ko-KR" altLang="en-US" smtClean="0"/>
+              <a:rPr lang="ko-KR" altLang="en-US"/>
               <a:t>셋째 수준</a:t>
             </a:r>
           </a:p>
           <a:p>
             <a:pPr lvl="3"/>
             <a:r>
-              <a:rPr lang="ko-KR" altLang="en-US" smtClean="0"/>
+              <a:rPr lang="ko-KR" altLang="en-US"/>
               <a:t>넷째 수준</a:t>
             </a:r>
           </a:p>
           <a:p>
             <a:pPr lvl="4"/>
             <a:r>
-              <a:rPr lang="ko-KR" altLang="en-US" smtClean="0"/>
+              <a:rPr lang="ko-KR" altLang="en-US"/>
               <a:t>다섯째 수준</a:t>
             </a:r>
             <a:endParaRPr lang="en-US" dirty="0"/>
@@ -1580,35 +2152,35 @@
           <a:p>
             <a:pPr lvl="0"/>
             <a:r>
-              <a:rPr lang="ko-KR" altLang="en-US" smtClean="0"/>
+              <a:rPr lang="ko-KR" altLang="en-US"/>
               <a:t>마스터 텍스트 스타일을 편집합니다</a:t>
             </a:r>
           </a:p>
           <a:p>
             <a:pPr lvl="1"/>
             <a:r>
-              <a:rPr lang="ko-KR" altLang="en-US" smtClean="0"/>
+              <a:rPr lang="ko-KR" altLang="en-US"/>
               <a:t>둘째 수준</a:t>
             </a:r>
           </a:p>
           <a:p>
             <a:pPr lvl="2"/>
             <a:r>
-              <a:rPr lang="ko-KR" altLang="en-US" smtClean="0"/>
+              <a:rPr lang="ko-KR" altLang="en-US"/>
               <a:t>셋째 수준</a:t>
             </a:r>
           </a:p>
           <a:p>
             <a:pPr lvl="3"/>
             <a:r>
-              <a:rPr lang="ko-KR" altLang="en-US" smtClean="0"/>
+              <a:rPr lang="ko-KR" altLang="en-US"/>
               <a:t>넷째 수준</a:t>
             </a:r>
           </a:p>
           <a:p>
             <a:pPr lvl="4"/>
             <a:r>
-              <a:rPr lang="ko-KR" altLang="en-US" smtClean="0"/>
+              <a:rPr lang="ko-KR" altLang="en-US"/>
               <a:t>다섯째 수준</a:t>
             </a:r>
             <a:endParaRPr lang="en-US" dirty="0"/>
@@ -1734,7 +2306,7 @@
           </a:lstStyle>
           <a:p>
             <a:r>
-              <a:rPr lang="ko-KR" altLang="en-US" smtClean="0"/>
+              <a:rPr lang="ko-KR" altLang="en-US"/>
               <a:t>마스터 제목 스타일 편집</a:t>
             </a:r>
             <a:endParaRPr lang="en-US" dirty="0"/>
@@ -1815,7 +2387,7 @@
           <a:p>
             <a:pPr lvl="0"/>
             <a:r>
-              <a:rPr lang="ko-KR" altLang="en-US" smtClean="0"/>
+              <a:rPr lang="ko-KR" altLang="en-US"/>
               <a:t>마스터 텍스트 스타일을 편집합니다</a:t>
             </a:r>
           </a:p>
@@ -1879,35 +2451,35 @@
           <a:p>
             <a:pPr lvl="0"/>
             <a:r>
-              <a:rPr lang="ko-KR" altLang="en-US" smtClean="0"/>
+              <a:rPr lang="ko-KR" altLang="en-US"/>
               <a:t>마스터 텍스트 스타일을 편집합니다</a:t>
             </a:r>
           </a:p>
           <a:p>
             <a:pPr lvl="1"/>
             <a:r>
-              <a:rPr lang="ko-KR" altLang="en-US" smtClean="0"/>
+              <a:rPr lang="ko-KR" altLang="en-US"/>
               <a:t>둘째 수준</a:t>
             </a:r>
           </a:p>
           <a:p>
             <a:pPr lvl="2"/>
             <a:r>
-              <a:rPr lang="ko-KR" altLang="en-US" smtClean="0"/>
+              <a:rPr lang="ko-KR" altLang="en-US"/>
               <a:t>셋째 수준</a:t>
             </a:r>
           </a:p>
           <a:p>
             <a:pPr lvl="3"/>
             <a:r>
-              <a:rPr lang="ko-KR" altLang="en-US" smtClean="0"/>
+              <a:rPr lang="ko-KR" altLang="en-US"/>
               <a:t>넷째 수준</a:t>
             </a:r>
           </a:p>
           <a:p>
             <a:pPr lvl="4"/>
             <a:r>
-              <a:rPr lang="ko-KR" altLang="en-US" smtClean="0"/>
+              <a:rPr lang="ko-KR" altLang="en-US"/>
               <a:t>다섯째 수준</a:t>
             </a:r>
             <a:endParaRPr lang="en-US" dirty="0"/>
@@ -1988,7 +2560,7 @@
           <a:p>
             <a:pPr lvl="0"/>
             <a:r>
-              <a:rPr lang="ko-KR" altLang="en-US" smtClean="0"/>
+              <a:rPr lang="ko-KR" altLang="en-US"/>
               <a:t>마스터 텍스트 스타일을 편집합니다</a:t>
             </a:r>
           </a:p>
@@ -2052,35 +2624,35 @@
           <a:p>
             <a:pPr lvl="0"/>
             <a:r>
-              <a:rPr lang="ko-KR" altLang="en-US" smtClean="0"/>
+              <a:rPr lang="ko-KR" altLang="en-US"/>
               <a:t>마스터 텍스트 스타일을 편집합니다</a:t>
             </a:r>
           </a:p>
           <a:p>
             <a:pPr lvl="1"/>
             <a:r>
-              <a:rPr lang="ko-KR" altLang="en-US" smtClean="0"/>
+              <a:rPr lang="ko-KR" altLang="en-US"/>
               <a:t>둘째 수준</a:t>
             </a:r>
           </a:p>
           <a:p>
             <a:pPr lvl="2"/>
             <a:r>
-              <a:rPr lang="ko-KR" altLang="en-US" smtClean="0"/>
+              <a:rPr lang="ko-KR" altLang="en-US"/>
               <a:t>셋째 수준</a:t>
             </a:r>
           </a:p>
           <a:p>
             <a:pPr lvl="3"/>
             <a:r>
-              <a:rPr lang="ko-KR" altLang="en-US" smtClean="0"/>
+              <a:rPr lang="ko-KR" altLang="en-US"/>
               <a:t>넷째 수준</a:t>
             </a:r>
           </a:p>
           <a:p>
             <a:pPr lvl="4"/>
             <a:r>
-              <a:rPr lang="ko-KR" altLang="en-US" smtClean="0"/>
+              <a:rPr lang="ko-KR" altLang="en-US"/>
               <a:t>다섯째 수준</a:t>
             </a:r>
             <a:endParaRPr lang="en-US" dirty="0"/>
@@ -2193,7 +2765,7 @@
           <a:lstStyle/>
           <a:p>
             <a:r>
-              <a:rPr lang="ko-KR" altLang="en-US" smtClean="0"/>
+              <a:rPr lang="ko-KR" altLang="en-US"/>
               <a:t>마스터 제목 스타일 편집</a:t>
             </a:r>
             <a:endParaRPr lang="en-US" dirty="0"/>
@@ -2452,7 +3024,7 @@
           </a:lstStyle>
           <a:p>
             <a:r>
-              <a:rPr lang="ko-KR" altLang="en-US" smtClean="0"/>
+              <a:rPr lang="ko-KR" altLang="en-US"/>
               <a:t>마스터 제목 스타일 편집</a:t>
             </a:r>
             <a:endParaRPr lang="en-US" dirty="0"/>
@@ -2509,35 +3081,35 @@
           <a:p>
             <a:pPr lvl="0"/>
             <a:r>
-              <a:rPr lang="ko-KR" altLang="en-US" smtClean="0"/>
+              <a:rPr lang="ko-KR" altLang="en-US"/>
               <a:t>마스터 텍스트 스타일을 편집합니다</a:t>
             </a:r>
           </a:p>
           <a:p>
             <a:pPr lvl="1"/>
             <a:r>
-              <a:rPr lang="ko-KR" altLang="en-US" smtClean="0"/>
+              <a:rPr lang="ko-KR" altLang="en-US"/>
               <a:t>둘째 수준</a:t>
             </a:r>
           </a:p>
           <a:p>
             <a:pPr lvl="2"/>
             <a:r>
-              <a:rPr lang="ko-KR" altLang="en-US" smtClean="0"/>
+              <a:rPr lang="ko-KR" altLang="en-US"/>
               <a:t>셋째 수준</a:t>
             </a:r>
           </a:p>
           <a:p>
             <a:pPr lvl="3"/>
             <a:r>
-              <a:rPr lang="ko-KR" altLang="en-US" smtClean="0"/>
+              <a:rPr lang="ko-KR" altLang="en-US"/>
               <a:t>넷째 수준</a:t>
             </a:r>
           </a:p>
           <a:p>
             <a:pPr lvl="4"/>
             <a:r>
-              <a:rPr lang="ko-KR" altLang="en-US" smtClean="0"/>
+              <a:rPr lang="ko-KR" altLang="en-US"/>
               <a:t>다섯째 수준</a:t>
             </a:r>
             <a:endParaRPr lang="en-US" dirty="0"/>
@@ -2612,7 +3184,7 @@
           <a:p>
             <a:pPr lvl="0"/>
             <a:r>
-              <a:rPr lang="ko-KR" altLang="en-US" smtClean="0"/>
+              <a:rPr lang="ko-KR" altLang="en-US"/>
               <a:t>마스터 텍스트 스타일을 편집합니다</a:t>
             </a:r>
           </a:p>
@@ -2855,7 +3427,7 @@
           </a:lstStyle>
           <a:p>
             <a:r>
-              <a:rPr lang="ko-KR" altLang="en-US" smtClean="0"/>
+              <a:rPr lang="ko-KR" altLang="en-US"/>
               <a:t>마스터 제목 스타일 편집</a:t>
             </a:r>
             <a:endParaRPr lang="en-US" dirty="0"/>
@@ -2922,7 +3494,7 @@
           </a:lstStyle>
           <a:p>
             <a:r>
-              <a:rPr lang="ko-KR" altLang="en-US" smtClean="0"/>
+              <a:rPr lang="ko-KR" altLang="en-US"/>
               <a:t>그림을 추가하려면 아이콘을 클릭하십시오</a:t>
             </a:r>
             <a:endParaRPr lang="en-US" dirty="0"/>
@@ -2997,7 +3569,7 @@
           <a:p>
             <a:pPr lvl="0"/>
             <a:r>
-              <a:rPr lang="ko-KR" altLang="en-US" smtClean="0"/>
+              <a:rPr lang="ko-KR" altLang="en-US"/>
               <a:t>마스터 텍스트 스타일을 편집합니다</a:t>
             </a:r>
           </a:p>
@@ -3206,7 +3778,7 @@
           <a:lstStyle/>
           <a:p>
             <a:r>
-              <a:rPr lang="ko-KR" altLang="en-US" smtClean="0"/>
+              <a:rPr lang="ko-KR" altLang="en-US"/>
               <a:t>마스터 제목 스타일 편집</a:t>
             </a:r>
             <a:endParaRPr lang="en-US" dirty="0"/>
@@ -3240,35 +3812,35 @@
           <a:p>
             <a:pPr lvl="0"/>
             <a:r>
-              <a:rPr lang="ko-KR" altLang="en-US" smtClean="0"/>
+              <a:rPr lang="ko-KR" altLang="en-US"/>
               <a:t>마스터 텍스트 스타일을 편집합니다</a:t>
             </a:r>
           </a:p>
           <a:p>
             <a:pPr lvl="1"/>
             <a:r>
-              <a:rPr lang="ko-KR" altLang="en-US" smtClean="0"/>
+              <a:rPr lang="ko-KR" altLang="en-US"/>
               <a:t>둘째 수준</a:t>
             </a:r>
           </a:p>
           <a:p>
             <a:pPr lvl="2"/>
             <a:r>
-              <a:rPr lang="ko-KR" altLang="en-US" smtClean="0"/>
+              <a:rPr lang="ko-KR" altLang="en-US"/>
               <a:t>셋째 수준</a:t>
             </a:r>
           </a:p>
           <a:p>
             <a:pPr lvl="3"/>
             <a:r>
-              <a:rPr lang="ko-KR" altLang="en-US" smtClean="0"/>
+              <a:rPr lang="ko-KR" altLang="en-US"/>
               <a:t>넷째 수준</a:t>
             </a:r>
           </a:p>
           <a:p>
             <a:pPr lvl="4"/>
             <a:r>
-              <a:rPr lang="ko-KR" altLang="en-US" smtClean="0"/>
+              <a:rPr lang="ko-KR" altLang="en-US"/>
               <a:t>다섯째 수준</a:t>
             </a:r>
             <a:endParaRPr lang="en-US" dirty="0"/>
@@ -3751,7 +4323,7 @@
       </a:lvl9pPr>
     </p:otherStyle>
   </p:txStyles>
-  <p:extLst mod="1">
+  <p:extLst>
     <p:ext uri="{27BBF7A9-308A-43DC-89C8-2F10F3537804}">
       <p15:sldGuideLst xmlns:p15="http://schemas.microsoft.com/office/powerpoint/2012/main">
         <p15:guide id="3" orient="horz" pos="1368">
@@ -3838,18 +4410,17 @@
           <a:lstStyle/>
           <a:p>
             <a:r>
-              <a:rPr lang="ko-KR" altLang="en-US" dirty="0" smtClean="0"/>
+              <a:rPr lang="ko-KR" altLang="en-US" dirty="0"/>
               <a:t>기업업무 </a:t>
             </a:r>
             <a:r>
-              <a:rPr lang="en-US" altLang="ko-KR" dirty="0" smtClean="0"/>
+              <a:rPr lang="en-US" altLang="ko-KR" dirty="0"/>
               <a:t>2</a:t>
             </a:r>
             <a:r>
-              <a:rPr lang="ko-KR" altLang="en-US" dirty="0" smtClean="0"/>
+              <a:rPr lang="ko-KR" altLang="en-US" dirty="0"/>
               <a:t>강 과제</a:t>
             </a:r>
-            <a:endParaRPr lang="ko-KR" altLang="en-US" dirty="0"/>
           </a:p>
         </p:txBody>
       </p:sp>
@@ -3874,7 +4445,7 @@
           <a:lstStyle/>
           <a:p>
             <a:r>
-              <a:rPr lang="en-US" altLang="ko-KR" dirty="0" smtClean="0"/>
+              <a:rPr lang="en-US" altLang="ko-KR" dirty="0"/>
               <a:t>JavaScript 2</a:t>
             </a:r>
             <a:endParaRPr lang="ko-KR" altLang="en-US" dirty="0"/>
@@ -3938,8 +4509,8 @@
               <a:t>슬라이드 </a:t>
             </a:r>
             <a:r>
-              <a:rPr lang="en-US" altLang="ko-KR" sz="1600" dirty="0" smtClean="0"/>
-              <a:t> </a:t>
+              <a:rPr lang="en-US" altLang="ko-KR" sz="1600" dirty="0"/>
+              <a:t>17 </a:t>
             </a:r>
             <a:r>
               <a:rPr lang="ko-KR" altLang="en-US" sz="1600" dirty="0"/>
@@ -3948,6 +4519,66 @@
           </a:p>
         </p:txBody>
       </p:sp>
+      <p:pic>
+        <p:nvPicPr>
+          <p:cNvPr id="4" name="그림 3">
+            <a:extLst>
+              <a:ext uri="{FF2B5EF4-FFF2-40B4-BE49-F238E27FC236}">
+                <a16:creationId xmlns:a16="http://schemas.microsoft.com/office/drawing/2014/main" id="{52CF0EE5-9930-C83F-5D1E-B8F954BD50B7}"/>
+              </a:ext>
+            </a:extLst>
+          </p:cNvPr>
+          <p:cNvPicPr>
+            <a:picLocks noChangeAspect="1"/>
+          </p:cNvPicPr>
+          <p:nvPr/>
+        </p:nvPicPr>
+        <p:blipFill>
+          <a:blip r:embed="rId2"/>
+          <a:stretch>
+            <a:fillRect/>
+          </a:stretch>
+        </p:blipFill>
+        <p:spPr>
+          <a:xfrm>
+            <a:off x="777768" y="1167736"/>
+            <a:ext cx="5318232" cy="4522527"/>
+          </a:xfrm>
+          <a:prstGeom prst="rect">
+            <a:avLst/>
+          </a:prstGeom>
+        </p:spPr>
+      </p:pic>
+      <p:pic>
+        <p:nvPicPr>
+          <p:cNvPr id="6" name="그림 5">
+            <a:extLst>
+              <a:ext uri="{FF2B5EF4-FFF2-40B4-BE49-F238E27FC236}">
+                <a16:creationId xmlns:a16="http://schemas.microsoft.com/office/drawing/2014/main" id="{1675F258-4860-A13E-2AFA-D1361ED746CB}"/>
+              </a:ext>
+            </a:extLst>
+          </p:cNvPr>
+          <p:cNvPicPr>
+            <a:picLocks noChangeAspect="1"/>
+          </p:cNvPicPr>
+          <p:nvPr/>
+        </p:nvPicPr>
+        <p:blipFill>
+          <a:blip r:embed="rId3"/>
+          <a:stretch>
+            <a:fillRect/>
+          </a:stretch>
+        </p:blipFill>
+        <p:spPr>
+          <a:xfrm>
+            <a:off x="8026334" y="2593931"/>
+            <a:ext cx="2540131" cy="1670136"/>
+          </a:xfrm>
+          <a:prstGeom prst="rect">
+            <a:avLst/>
+          </a:prstGeom>
+        </p:spPr>
+      </p:pic>
     </p:spTree>
     <p:extLst>
       <p:ext uri="{BB962C8B-B14F-4D97-AF65-F5344CB8AC3E}">
@@ -4001,17 +4632,106 @@
           <a:lstStyle/>
           <a:p>
             <a:r>
-              <a:rPr lang="ko-KR" altLang="en-US" sz="1600" dirty="0"/>
+              <a:rPr lang="ko-KR" altLang="en-US" sz="1600"/>
               <a:t>슬라이드 </a:t>
             </a:r>
             <a:r>
-              <a:rPr lang="en-US" altLang="ko-KR" sz="1600" dirty="0" smtClean="0"/>
-              <a:t> </a:t>
-            </a:r>
-            <a:r>
-              <a:rPr lang="ko-KR" altLang="en-US" sz="1600" dirty="0"/>
+              <a:rPr lang="en-US" altLang="ko-KR" sz="1600"/>
+              <a:t>17 </a:t>
+            </a:r>
+            <a:r>
+              <a:rPr lang="ko-KR" altLang="en-US" sz="1600"/>
               <a:t>실습</a:t>
             </a:r>
+            <a:endParaRPr lang="ko-KR" altLang="en-US" sz="1600" dirty="0"/>
+          </a:p>
+        </p:txBody>
+      </p:sp>
+      <p:pic>
+        <p:nvPicPr>
+          <p:cNvPr id="4" name="그림 3">
+            <a:extLst>
+              <a:ext uri="{FF2B5EF4-FFF2-40B4-BE49-F238E27FC236}">
+                <a16:creationId xmlns:a16="http://schemas.microsoft.com/office/drawing/2014/main" id="{7771A2B1-D6BC-736E-E7A4-65C9F8305F00}"/>
+              </a:ext>
+            </a:extLst>
+          </p:cNvPr>
+          <p:cNvPicPr>
+            <a:picLocks noChangeAspect="1"/>
+          </p:cNvPicPr>
+          <p:nvPr/>
+        </p:nvPicPr>
+        <p:blipFill>
+          <a:blip r:embed="rId2"/>
+          <a:stretch>
+            <a:fillRect/>
+          </a:stretch>
+        </p:blipFill>
+        <p:spPr>
+          <a:xfrm>
+            <a:off x="961760" y="1568394"/>
+            <a:ext cx="10268478" cy="2159111"/>
+          </a:xfrm>
+          <a:prstGeom prst="rect">
+            <a:avLst/>
+          </a:prstGeom>
+        </p:spPr>
+      </p:pic>
+      <p:sp>
+        <p:nvSpPr>
+          <p:cNvPr id="7" name="TextBox 6">
+            <a:extLst>
+              <a:ext uri="{FF2B5EF4-FFF2-40B4-BE49-F238E27FC236}">
+                <a16:creationId xmlns:a16="http://schemas.microsoft.com/office/drawing/2014/main" id="{E125A681-723B-69CD-421B-FEB3E6C01140}"/>
+              </a:ext>
+            </a:extLst>
+          </p:cNvPr>
+          <p:cNvSpPr txBox="1"/>
+          <p:nvPr/>
+        </p:nvSpPr>
+        <p:spPr>
+          <a:xfrm>
+            <a:off x="2753971" y="4196379"/>
+            <a:ext cx="6684055" cy="646331"/>
+          </a:xfrm>
+          <a:prstGeom prst="rect">
+            <a:avLst/>
+          </a:prstGeom>
+          <a:noFill/>
+        </p:spPr>
+        <p:txBody>
+          <a:bodyPr wrap="square" rtlCol="0">
+            <a:spAutoFit/>
+          </a:bodyPr>
+          <a:lstStyle/>
+          <a:p>
+            <a:r>
+              <a:rPr lang="ko-KR" altLang="en-US" dirty="0"/>
+              <a:t>하이퍼링크를 클릭 시 경고창이 출력된다</a:t>
+            </a:r>
+            <a:r>
+              <a:rPr lang="en-US" altLang="ko-KR" dirty="0"/>
+              <a:t>.</a:t>
+            </a:r>
+          </a:p>
+          <a:p>
+            <a:r>
+              <a:rPr lang="ko-KR" altLang="en-US" dirty="0"/>
+              <a:t>확인을 누르면 이동하고</a:t>
+            </a:r>
+            <a:r>
+              <a:rPr lang="en-US" altLang="ko-KR" dirty="0"/>
+              <a:t>, </a:t>
+            </a:r>
+            <a:r>
+              <a:rPr lang="ko-KR" altLang="en-US" dirty="0"/>
+              <a:t>취소를 누르면 해당 페이지에 머무른다</a:t>
+            </a:r>
+            <a:r>
+              <a:rPr lang="en-US" altLang="ko-KR" dirty="0"/>
+              <a:t>.</a:t>
+            </a:r>
+            <a:endParaRPr lang="ko-KR" altLang="en-US" dirty="0"/>
           </a:p>
         </p:txBody>
       </p:sp>
@@ -4068,17 +4788,174 @@
           <a:lstStyle/>
           <a:p>
             <a:r>
-              <a:rPr lang="ko-KR" altLang="en-US" sz="1600" dirty="0"/>
+              <a:rPr lang="ko-KR" altLang="en-US" sz="1600"/>
               <a:t>슬라이드 </a:t>
             </a:r>
             <a:r>
-              <a:rPr lang="en-US" altLang="ko-KR" sz="1600" dirty="0" smtClean="0"/>
+              <a:rPr lang="en-US" altLang="ko-KR" sz="1600"/>
+              <a:t>17 </a:t>
+            </a:r>
+            <a:r>
+              <a:rPr lang="ko-KR" altLang="en-US" sz="1600"/>
+              <a:t>실습</a:t>
+            </a:r>
+            <a:endParaRPr lang="ko-KR" altLang="en-US" sz="1600" dirty="0"/>
+          </a:p>
+        </p:txBody>
+      </p:sp>
+      <p:pic>
+        <p:nvPicPr>
+          <p:cNvPr id="4" name="그림 3">
+            <a:extLst>
+              <a:ext uri="{FF2B5EF4-FFF2-40B4-BE49-F238E27FC236}">
+                <a16:creationId xmlns:a16="http://schemas.microsoft.com/office/drawing/2014/main" id="{2273849A-3FFF-5FB5-0CBA-6FEA465ECC8E}"/>
+              </a:ext>
+            </a:extLst>
+          </p:cNvPr>
+          <p:cNvPicPr>
+            <a:picLocks noChangeAspect="1"/>
+          </p:cNvPicPr>
+          <p:nvPr/>
+        </p:nvPicPr>
+        <p:blipFill>
+          <a:blip r:embed="rId2"/>
+          <a:stretch>
+            <a:fillRect/>
+          </a:stretch>
+        </p:blipFill>
+        <p:spPr>
+          <a:xfrm>
+            <a:off x="2228785" y="990560"/>
+            <a:ext cx="3049017" cy="1847889"/>
+          </a:xfrm>
+          <a:prstGeom prst="rect">
+            <a:avLst/>
+          </a:prstGeom>
+        </p:spPr>
+      </p:pic>
+      <p:pic>
+        <p:nvPicPr>
+          <p:cNvPr id="6" name="그림 5">
+            <a:extLst>
+              <a:ext uri="{FF2B5EF4-FFF2-40B4-BE49-F238E27FC236}">
+                <a16:creationId xmlns:a16="http://schemas.microsoft.com/office/drawing/2014/main" id="{E97D1682-8890-267B-4632-422EEED7AB51}"/>
+              </a:ext>
+            </a:extLst>
+          </p:cNvPr>
+          <p:cNvPicPr>
+            <a:picLocks noChangeAspect="1"/>
+          </p:cNvPicPr>
+          <p:nvPr/>
+        </p:nvPicPr>
+        <p:blipFill>
+          <a:blip r:embed="rId3"/>
+          <a:stretch>
+            <a:fillRect/>
+          </a:stretch>
+        </p:blipFill>
+        <p:spPr>
+          <a:xfrm>
+            <a:off x="7454836" y="1095312"/>
+            <a:ext cx="2508379" cy="1638384"/>
+          </a:xfrm>
+          <a:prstGeom prst="rect">
+            <a:avLst/>
+          </a:prstGeom>
+        </p:spPr>
+      </p:pic>
+      <p:sp>
+        <p:nvSpPr>
+          <p:cNvPr id="7" name="TextBox 6">
+            <a:extLst>
+              <a:ext uri="{FF2B5EF4-FFF2-40B4-BE49-F238E27FC236}">
+                <a16:creationId xmlns:a16="http://schemas.microsoft.com/office/drawing/2014/main" id="{FADB3A80-8FAC-C208-4C90-BCE2C04EAE3C}"/>
+              </a:ext>
+            </a:extLst>
+          </p:cNvPr>
+          <p:cNvSpPr txBox="1"/>
+          <p:nvPr/>
+        </p:nvSpPr>
+        <p:spPr>
+          <a:xfrm>
+            <a:off x="1924050" y="4219553"/>
+            <a:ext cx="8553450" cy="646331"/>
+          </a:xfrm>
+          <a:prstGeom prst="rect">
+            <a:avLst/>
+          </a:prstGeom>
+          <a:noFill/>
+        </p:spPr>
+        <p:txBody>
+          <a:bodyPr wrap="square" rtlCol="0">
+            <a:spAutoFit/>
+          </a:bodyPr>
+          <a:lstStyle/>
+          <a:p>
+            <a:r>
+              <a:rPr lang="ko-KR" altLang="en-US" dirty="0"/>
+              <a:t>체크박스 </a:t>
+            </a:r>
+            <a:r>
+              <a:rPr lang="en-US" altLang="ko-KR" dirty="0"/>
+              <a:t>‘</a:t>
+            </a:r>
+            <a:r>
+              <a:rPr lang="ko-KR" altLang="en-US" dirty="0"/>
+              <a:t>빵</a:t>
+            </a:r>
+            <a:r>
+              <a:rPr lang="en-US" altLang="ko-KR" dirty="0"/>
+              <a:t>＇</a:t>
+            </a:r>
+            <a:r>
+              <a:rPr lang="ko-KR" altLang="en-US" dirty="0"/>
+              <a:t>은 클릭</a:t>
+            </a:r>
+            <a:r>
+              <a:rPr lang="en-US" altLang="ko-KR" dirty="0"/>
+              <a:t>, </a:t>
+            </a:r>
+            <a:r>
+              <a:rPr lang="ko-KR" altLang="en-US" dirty="0"/>
+              <a:t>해제가 가능하지만 체크박스 </a:t>
+            </a:r>
+            <a:r>
+              <a:rPr lang="en-US" altLang="ko-KR" dirty="0"/>
+              <a:t>‘</a:t>
+            </a:r>
+            <a:r>
+              <a:rPr lang="ko-KR" altLang="en-US" dirty="0"/>
+              <a:t>술</a:t>
+            </a:r>
+            <a:r>
+              <a:rPr lang="en-US" altLang="ko-KR" dirty="0"/>
+              <a:t>＇</a:t>
+            </a:r>
+            <a:r>
+              <a:rPr lang="ko-KR" altLang="en-US" dirty="0"/>
+              <a:t>은 </a:t>
+            </a:r>
+            <a:r>
+              <a:rPr lang="en-US" altLang="ko-KR" dirty="0"/>
+              <a:t>onclick=</a:t>
+            </a:r>
+            <a:r>
+              <a:rPr lang="en-US" altLang="ko-KR" dirty="0" err="1"/>
+              <a:t>noAction</a:t>
+            </a:r>
+            <a:r>
+              <a:rPr lang="en-US" altLang="ko-KR" dirty="0"/>
               <a:t> </a:t>
             </a:r>
             <a:r>
-              <a:rPr lang="ko-KR" altLang="en-US" sz="1600" dirty="0"/>
-              <a:t>실습</a:t>
-            </a:r>
+              <a:rPr lang="ko-KR" altLang="en-US" dirty="0"/>
+              <a:t>상태이기 때문에 체크가 불가능하다</a:t>
+            </a:r>
+            <a:r>
+              <a:rPr lang="en-US" altLang="ko-KR" dirty="0"/>
+              <a:t>.</a:t>
+            </a:r>
+            <a:endParaRPr lang="ko-KR" altLang="en-US" dirty="0"/>
           </a:p>
         </p:txBody>
       </p:sp>
@@ -4139,8 +5016,8 @@
               <a:t>슬라이드 </a:t>
             </a:r>
             <a:r>
-              <a:rPr lang="en-US" altLang="ko-KR" sz="1600" dirty="0" smtClean="0"/>
-              <a:t> </a:t>
+              <a:rPr lang="en-US" altLang="ko-KR" sz="1600" dirty="0"/>
+              <a:t>22 </a:t>
             </a:r>
             <a:r>
               <a:rPr lang="ko-KR" altLang="en-US" sz="1600" dirty="0"/>
@@ -4149,6 +5026,66 @@
           </a:p>
         </p:txBody>
       </p:sp>
+      <p:pic>
+        <p:nvPicPr>
+          <p:cNvPr id="4" name="그림 3">
+            <a:extLst>
+              <a:ext uri="{FF2B5EF4-FFF2-40B4-BE49-F238E27FC236}">
+                <a16:creationId xmlns:a16="http://schemas.microsoft.com/office/drawing/2014/main" id="{6AA74554-5935-A700-97AC-EBF29E05BC00}"/>
+              </a:ext>
+            </a:extLst>
+          </p:cNvPr>
+          <p:cNvPicPr>
+            <a:picLocks noChangeAspect="1"/>
+          </p:cNvPicPr>
+          <p:nvPr/>
+        </p:nvPicPr>
+        <p:blipFill>
+          <a:blip r:embed="rId2"/>
+          <a:stretch>
+            <a:fillRect/>
+          </a:stretch>
+        </p:blipFill>
+        <p:spPr>
+          <a:xfrm>
+            <a:off x="914298" y="620652"/>
+            <a:ext cx="4717118" cy="5616696"/>
+          </a:xfrm>
+          <a:prstGeom prst="rect">
+            <a:avLst/>
+          </a:prstGeom>
+        </p:spPr>
+      </p:pic>
+      <p:pic>
+        <p:nvPicPr>
+          <p:cNvPr id="6" name="그림 5">
+            <a:extLst>
+              <a:ext uri="{FF2B5EF4-FFF2-40B4-BE49-F238E27FC236}">
+                <a16:creationId xmlns:a16="http://schemas.microsoft.com/office/drawing/2014/main" id="{3F8EC064-0477-E5D6-9258-AEA3D747C777}"/>
+              </a:ext>
+            </a:extLst>
+          </p:cNvPr>
+          <p:cNvPicPr>
+            <a:picLocks noChangeAspect="1"/>
+          </p:cNvPicPr>
+          <p:nvPr/>
+        </p:nvPicPr>
+        <p:blipFill>
+          <a:blip r:embed="rId3"/>
+          <a:stretch>
+            <a:fillRect/>
+          </a:stretch>
+        </p:blipFill>
+        <p:spPr>
+          <a:xfrm>
+            <a:off x="7286563" y="2751125"/>
+            <a:ext cx="3366929" cy="1355750"/>
+          </a:xfrm>
+          <a:prstGeom prst="rect">
+            <a:avLst/>
+          </a:prstGeom>
+        </p:spPr>
+      </p:pic>
     </p:spTree>
     <p:extLst>
       <p:ext uri="{BB962C8B-B14F-4D97-AF65-F5344CB8AC3E}">
@@ -4202,17 +5139,154 @@
           <a:lstStyle/>
           <a:p>
             <a:r>
-              <a:rPr lang="ko-KR" altLang="en-US" sz="1600" dirty="0"/>
+              <a:rPr lang="ko-KR" altLang="en-US" sz="1600"/>
               <a:t>슬라이드 </a:t>
             </a:r>
             <a:r>
-              <a:rPr lang="en-US" altLang="ko-KR" sz="1600" dirty="0" smtClean="0"/>
-              <a:t> </a:t>
-            </a:r>
-            <a:r>
-              <a:rPr lang="ko-KR" altLang="en-US" sz="1600" dirty="0"/>
+              <a:rPr lang="en-US" altLang="ko-KR" sz="1600"/>
+              <a:t>22 </a:t>
+            </a:r>
+            <a:r>
+              <a:rPr lang="ko-KR" altLang="en-US" sz="1600"/>
               <a:t>실습</a:t>
             </a:r>
+            <a:endParaRPr lang="ko-KR" altLang="en-US" sz="1600" dirty="0"/>
+          </a:p>
+        </p:txBody>
+      </p:sp>
+      <p:pic>
+        <p:nvPicPr>
+          <p:cNvPr id="4" name="그림 3">
+            <a:extLst>
+              <a:ext uri="{FF2B5EF4-FFF2-40B4-BE49-F238E27FC236}">
+                <a16:creationId xmlns:a16="http://schemas.microsoft.com/office/drawing/2014/main" id="{AB98C994-85D6-8FF8-317A-996D26DF9A1E}"/>
+              </a:ext>
+            </a:extLst>
+          </p:cNvPr>
+          <p:cNvPicPr>
+            <a:picLocks noChangeAspect="1"/>
+          </p:cNvPicPr>
+          <p:nvPr/>
+        </p:nvPicPr>
+        <p:blipFill>
+          <a:blip r:embed="rId2"/>
+          <a:stretch>
+            <a:fillRect/>
+          </a:stretch>
+        </p:blipFill>
+        <p:spPr>
+          <a:xfrm>
+            <a:off x="721895" y="936579"/>
+            <a:ext cx="3413823" cy="2054270"/>
+          </a:xfrm>
+          <a:prstGeom prst="rect">
+            <a:avLst/>
+          </a:prstGeom>
+        </p:spPr>
+      </p:pic>
+      <p:sp>
+        <p:nvSpPr>
+          <p:cNvPr id="5" name="TextBox 4">
+            <a:extLst>
+              <a:ext uri="{FF2B5EF4-FFF2-40B4-BE49-F238E27FC236}">
+                <a16:creationId xmlns:a16="http://schemas.microsoft.com/office/drawing/2014/main" id="{A3BDEAF5-FED2-19EA-A779-28F986002C07}"/>
+              </a:ext>
+            </a:extLst>
+          </p:cNvPr>
+          <p:cNvSpPr txBox="1"/>
+          <p:nvPr/>
+        </p:nvSpPr>
+        <p:spPr>
+          <a:xfrm>
+            <a:off x="6096000" y="1640549"/>
+            <a:ext cx="3838117" cy="646331"/>
+          </a:xfrm>
+          <a:prstGeom prst="rect">
+            <a:avLst/>
+          </a:prstGeom>
+          <a:noFill/>
+        </p:spPr>
+        <p:txBody>
+          <a:bodyPr wrap="square" rtlCol="0">
+            <a:spAutoFit/>
+          </a:bodyPr>
+          <a:lstStyle/>
+          <a:p>
+            <a:r>
+              <a:rPr lang="ko-KR" altLang="en-US"/>
+              <a:t>버튼 태그를 제외한 다른 부분을 클릭하면 두 줄이 출력되고</a:t>
+            </a:r>
+            <a:endParaRPr lang="ko-KR" altLang="en-US" dirty="0"/>
+          </a:p>
+        </p:txBody>
+      </p:sp>
+      <p:pic>
+        <p:nvPicPr>
+          <p:cNvPr id="7" name="그림 6">
+            <a:extLst>
+              <a:ext uri="{FF2B5EF4-FFF2-40B4-BE49-F238E27FC236}">
+                <a16:creationId xmlns:a16="http://schemas.microsoft.com/office/drawing/2014/main" id="{D381B40B-3C54-712B-9FA7-8EC9A9135361}"/>
+              </a:ext>
+            </a:extLst>
+          </p:cNvPr>
+          <p:cNvPicPr>
+            <a:picLocks noChangeAspect="1"/>
+          </p:cNvPicPr>
+          <p:nvPr/>
+        </p:nvPicPr>
+        <p:blipFill>
+          <a:blip r:embed="rId3"/>
+          <a:stretch>
+            <a:fillRect/>
+          </a:stretch>
+        </p:blipFill>
+        <p:spPr>
+          <a:xfrm>
+            <a:off x="876866" y="3660708"/>
+            <a:ext cx="3258852" cy="2587692"/>
+          </a:xfrm>
+          <a:prstGeom prst="rect">
+            <a:avLst/>
+          </a:prstGeom>
+        </p:spPr>
+      </p:pic>
+      <p:sp>
+        <p:nvSpPr>
+          <p:cNvPr id="8" name="TextBox 7">
+            <a:extLst>
+              <a:ext uri="{FF2B5EF4-FFF2-40B4-BE49-F238E27FC236}">
+                <a16:creationId xmlns:a16="http://schemas.microsoft.com/office/drawing/2014/main" id="{FF4FC32C-779F-523F-5031-98D9570DC004}"/>
+              </a:ext>
+            </a:extLst>
+          </p:cNvPr>
+          <p:cNvSpPr txBox="1"/>
+          <p:nvPr/>
+        </p:nvSpPr>
+        <p:spPr>
+          <a:xfrm>
+            <a:off x="5901510" y="4848119"/>
+            <a:ext cx="4227096" cy="369332"/>
+          </a:xfrm>
+          <a:prstGeom prst="rect">
+            <a:avLst/>
+          </a:prstGeom>
+          <a:noFill/>
+        </p:spPr>
+        <p:txBody>
+          <a:bodyPr wrap="square" rtlCol="0">
+            <a:spAutoFit/>
+          </a:bodyPr>
+          <a:lstStyle/>
+          <a:p>
+            <a:r>
+              <a:rPr lang="ko-KR" altLang="en-US" dirty="0"/>
+              <a:t>버튼 태그를 클릭하면 세 줄이 출력된다</a:t>
+            </a:r>
+            <a:r>
+              <a:rPr lang="en-US" altLang="ko-KR" dirty="0"/>
+              <a:t>.</a:t>
+            </a:r>
+            <a:endParaRPr lang="ko-KR" altLang="en-US" dirty="0"/>
           </a:p>
         </p:txBody>
       </p:sp>
@@ -4273,7 +5347,7 @@
               <a:t>슬라이드 </a:t>
             </a:r>
             <a:r>
-              <a:rPr lang="en-US" altLang="ko-KR" sz="1600" dirty="0" smtClean="0"/>
+              <a:rPr lang="en-US" altLang="ko-KR" sz="1600" dirty="0"/>
               <a:t> </a:t>
             </a:r>
             <a:r>
@@ -4340,7 +5414,7 @@
               <a:t>슬라이드 </a:t>
             </a:r>
             <a:r>
-              <a:rPr lang="en-US" altLang="ko-KR" sz="1600" dirty="0" smtClean="0"/>
+              <a:rPr lang="en-US" altLang="ko-KR" sz="1600" dirty="0"/>
               <a:t> </a:t>
             </a:r>
             <a:r>
@@ -4407,7 +5481,7 @@
               <a:t>슬라이드 </a:t>
             </a:r>
             <a:r>
-              <a:rPr lang="en-US" altLang="ko-KR" sz="1600" dirty="0" smtClean="0"/>
+              <a:rPr lang="en-US" altLang="ko-KR" sz="1600" dirty="0"/>
               <a:t> </a:t>
             </a:r>
             <a:r>
@@ -4474,7 +5548,7 @@
               <a:t>슬라이드 </a:t>
             </a:r>
             <a:r>
-              <a:rPr lang="en-US" altLang="ko-KR" sz="1600" dirty="0" smtClean="0"/>
+              <a:rPr lang="en-US" altLang="ko-KR" sz="1600" dirty="0"/>
               <a:t> </a:t>
             </a:r>
             <a:r>
@@ -4488,73 +5562,6 @@
     <p:extLst>
       <p:ext uri="{BB962C8B-B14F-4D97-AF65-F5344CB8AC3E}">
         <p14:creationId xmlns:p14="http://schemas.microsoft.com/office/powerpoint/2010/main" val="4270141029"/>
-      </p:ext>
-    </p:extLst>
-  </p:cSld>
-  <p:clrMapOvr>
-    <a:masterClrMapping/>
-  </p:clrMapOvr>
-</p:sld>
-</file>
-
-<file path=ppt/slides/slide19.xml><?xml version="1.0" encoding="utf-8"?>
-<p:sld xmlns:a="http://schemas.openxmlformats.org/drawingml/2006/main" xmlns:r="http://schemas.openxmlformats.org/officeDocument/2006/relationships" xmlns:p="http://schemas.openxmlformats.org/presentationml/2006/main">
-  <p:cSld>
-    <p:spTree>
-      <p:nvGrpSpPr>
-        <p:cNvPr id="1" name=""/>
-        <p:cNvGrpSpPr/>
-        <p:nvPr/>
-      </p:nvGrpSpPr>
-      <p:grpSpPr>
-        <a:xfrm>
-          <a:off x="0" y="0"/>
-          <a:ext cx="0" cy="0"/>
-          <a:chOff x="0" y="0"/>
-          <a:chExt cx="0" cy="0"/>
-        </a:xfrm>
-      </p:grpSpPr>
-      <p:sp>
-        <p:nvSpPr>
-          <p:cNvPr id="2" name="제목 1"/>
-          <p:cNvSpPr>
-            <a:spLocks noGrp="1"/>
-          </p:cNvSpPr>
-          <p:nvPr>
-            <p:ph type="title"/>
-          </p:nvPr>
-        </p:nvSpPr>
-        <p:spPr>
-          <a:xfrm>
-            <a:off x="721895" y="0"/>
-            <a:ext cx="9601200" cy="453189"/>
-          </a:xfrm>
-        </p:spPr>
-        <p:txBody>
-          <a:bodyPr>
-            <a:normAutofit/>
-          </a:bodyPr>
-          <a:lstStyle/>
-          <a:p>
-            <a:r>
-              <a:rPr lang="ko-KR" altLang="en-US" sz="1600" dirty="0"/>
-              <a:t>슬라이드 </a:t>
-            </a:r>
-            <a:r>
-              <a:rPr lang="en-US" altLang="ko-KR" sz="1600" dirty="0" smtClean="0"/>
-              <a:t> </a:t>
-            </a:r>
-            <a:r>
-              <a:rPr lang="ko-KR" altLang="en-US" sz="1600" dirty="0"/>
-              <a:t>실습</a:t>
-            </a:r>
-          </a:p>
-        </p:txBody>
-      </p:sp>
-    </p:spTree>
-    <p:extLst>
-      <p:ext uri="{BB962C8B-B14F-4D97-AF65-F5344CB8AC3E}">
-        <p14:creationId xmlns:p14="http://schemas.microsoft.com/office/powerpoint/2010/main" val="1546396440"/>
       </p:ext>
     </p:extLst>
   </p:cSld>
@@ -4618,546 +5625,100 @@
           </a:p>
         </p:txBody>
       </p:sp>
+      <p:pic>
+        <p:nvPicPr>
+          <p:cNvPr id="4" name="그림 3">
+            <a:extLst>
+              <a:ext uri="{FF2B5EF4-FFF2-40B4-BE49-F238E27FC236}">
+                <a16:creationId xmlns:a16="http://schemas.microsoft.com/office/drawing/2014/main" id="{AB3D7F9E-C2FC-A7E4-D270-D0C4AAAFCBA2}"/>
+              </a:ext>
+            </a:extLst>
+          </p:cNvPr>
+          <p:cNvPicPr>
+            <a:picLocks noChangeAspect="1"/>
+          </p:cNvPicPr>
+          <p:nvPr/>
+        </p:nvPicPr>
+        <p:blipFill>
+          <a:blip r:embed="rId2"/>
+          <a:stretch>
+            <a:fillRect/>
+          </a:stretch>
+        </p:blipFill>
+        <p:spPr>
+          <a:xfrm>
+            <a:off x="721895" y="1584085"/>
+            <a:ext cx="6415721" cy="3689829"/>
+          </a:xfrm>
+          <a:prstGeom prst="rect">
+            <a:avLst/>
+          </a:prstGeom>
+        </p:spPr>
+      </p:pic>
+      <p:pic>
+        <p:nvPicPr>
+          <p:cNvPr id="6" name="그림 5">
+            <a:extLst>
+              <a:ext uri="{FF2B5EF4-FFF2-40B4-BE49-F238E27FC236}">
+                <a16:creationId xmlns:a16="http://schemas.microsoft.com/office/drawing/2014/main" id="{2073A3F9-2FAC-FD00-1995-F867286976ED}"/>
+              </a:ext>
+            </a:extLst>
+          </p:cNvPr>
+          <p:cNvPicPr>
+            <a:picLocks noChangeAspect="1"/>
+          </p:cNvPicPr>
+          <p:nvPr/>
+        </p:nvPicPr>
+        <p:blipFill>
+          <a:blip r:embed="rId3"/>
+          <a:stretch>
+            <a:fillRect/>
+          </a:stretch>
+        </p:blipFill>
+        <p:spPr>
+          <a:xfrm>
+            <a:off x="8411431" y="1927547"/>
+            <a:ext cx="2584583" cy="908097"/>
+          </a:xfrm>
+          <a:prstGeom prst="rect">
+            <a:avLst/>
+          </a:prstGeom>
+        </p:spPr>
+      </p:pic>
+      <p:pic>
+        <p:nvPicPr>
+          <p:cNvPr id="8" name="그림 7">
+            <a:extLst>
+              <a:ext uri="{FF2B5EF4-FFF2-40B4-BE49-F238E27FC236}">
+                <a16:creationId xmlns:a16="http://schemas.microsoft.com/office/drawing/2014/main" id="{3F91FBD8-3E55-A78E-6855-95ED18DC150D}"/>
+              </a:ext>
+            </a:extLst>
+          </p:cNvPr>
+          <p:cNvPicPr>
+            <a:picLocks noChangeAspect="1"/>
+          </p:cNvPicPr>
+          <p:nvPr/>
+        </p:nvPicPr>
+        <p:blipFill>
+          <a:blip r:embed="rId4"/>
+          <a:stretch>
+            <a:fillRect/>
+          </a:stretch>
+        </p:blipFill>
+        <p:spPr>
+          <a:xfrm>
+            <a:off x="8411431" y="3976636"/>
+            <a:ext cx="2559182" cy="908097"/>
+          </a:xfrm>
+          <a:prstGeom prst="rect">
+            <a:avLst/>
+          </a:prstGeom>
+        </p:spPr>
+      </p:pic>
     </p:spTree>
     <p:extLst>
       <p:ext uri="{BB962C8B-B14F-4D97-AF65-F5344CB8AC3E}">
         <p14:creationId xmlns:p14="http://schemas.microsoft.com/office/powerpoint/2010/main" val="3089877349"/>
-      </p:ext>
-    </p:extLst>
-  </p:cSld>
-  <p:clrMapOvr>
-    <a:masterClrMapping/>
-  </p:clrMapOvr>
-</p:sld>
-</file>
-
-<file path=ppt/slides/slide20.xml><?xml version="1.0" encoding="utf-8"?>
-<p:sld xmlns:a="http://schemas.openxmlformats.org/drawingml/2006/main" xmlns:r="http://schemas.openxmlformats.org/officeDocument/2006/relationships" xmlns:p="http://schemas.openxmlformats.org/presentationml/2006/main">
-  <p:cSld>
-    <p:spTree>
-      <p:nvGrpSpPr>
-        <p:cNvPr id="1" name=""/>
-        <p:cNvGrpSpPr/>
-        <p:nvPr/>
-      </p:nvGrpSpPr>
-      <p:grpSpPr>
-        <a:xfrm>
-          <a:off x="0" y="0"/>
-          <a:ext cx="0" cy="0"/>
-          <a:chOff x="0" y="0"/>
-          <a:chExt cx="0" cy="0"/>
-        </a:xfrm>
-      </p:grpSpPr>
-      <p:sp>
-        <p:nvSpPr>
-          <p:cNvPr id="2" name="제목 1"/>
-          <p:cNvSpPr>
-            <a:spLocks noGrp="1"/>
-          </p:cNvSpPr>
-          <p:nvPr>
-            <p:ph type="title"/>
-          </p:nvPr>
-        </p:nvSpPr>
-        <p:spPr>
-          <a:xfrm>
-            <a:off x="721895" y="0"/>
-            <a:ext cx="9601200" cy="453189"/>
-          </a:xfrm>
-        </p:spPr>
-        <p:txBody>
-          <a:bodyPr>
-            <a:normAutofit/>
-          </a:bodyPr>
-          <a:lstStyle/>
-          <a:p>
-            <a:r>
-              <a:rPr lang="ko-KR" altLang="en-US" sz="1600" dirty="0"/>
-              <a:t>슬라이드 </a:t>
-            </a:r>
-            <a:r>
-              <a:rPr lang="en-US" altLang="ko-KR" sz="1600" dirty="0" smtClean="0"/>
-              <a:t> </a:t>
-            </a:r>
-            <a:r>
-              <a:rPr lang="ko-KR" altLang="en-US" sz="1600" dirty="0"/>
-              <a:t>실습</a:t>
-            </a:r>
-          </a:p>
-        </p:txBody>
-      </p:sp>
-    </p:spTree>
-    <p:extLst>
-      <p:ext uri="{BB962C8B-B14F-4D97-AF65-F5344CB8AC3E}">
-        <p14:creationId xmlns:p14="http://schemas.microsoft.com/office/powerpoint/2010/main" val="3166858389"/>
-      </p:ext>
-    </p:extLst>
-  </p:cSld>
-  <p:clrMapOvr>
-    <a:masterClrMapping/>
-  </p:clrMapOvr>
-</p:sld>
-</file>
-
-<file path=ppt/slides/slide21.xml><?xml version="1.0" encoding="utf-8"?>
-<p:sld xmlns:a="http://schemas.openxmlformats.org/drawingml/2006/main" xmlns:r="http://schemas.openxmlformats.org/officeDocument/2006/relationships" xmlns:p="http://schemas.openxmlformats.org/presentationml/2006/main">
-  <p:cSld>
-    <p:spTree>
-      <p:nvGrpSpPr>
-        <p:cNvPr id="1" name=""/>
-        <p:cNvGrpSpPr/>
-        <p:nvPr/>
-      </p:nvGrpSpPr>
-      <p:grpSpPr>
-        <a:xfrm>
-          <a:off x="0" y="0"/>
-          <a:ext cx="0" cy="0"/>
-          <a:chOff x="0" y="0"/>
-          <a:chExt cx="0" cy="0"/>
-        </a:xfrm>
-      </p:grpSpPr>
-      <p:sp>
-        <p:nvSpPr>
-          <p:cNvPr id="2" name="제목 1"/>
-          <p:cNvSpPr>
-            <a:spLocks noGrp="1"/>
-          </p:cNvSpPr>
-          <p:nvPr>
-            <p:ph type="title"/>
-          </p:nvPr>
-        </p:nvSpPr>
-        <p:spPr>
-          <a:xfrm>
-            <a:off x="721895" y="0"/>
-            <a:ext cx="9601200" cy="453189"/>
-          </a:xfrm>
-        </p:spPr>
-        <p:txBody>
-          <a:bodyPr>
-            <a:normAutofit/>
-          </a:bodyPr>
-          <a:lstStyle/>
-          <a:p>
-            <a:r>
-              <a:rPr lang="ko-KR" altLang="en-US" sz="1600" dirty="0"/>
-              <a:t>슬라이드 </a:t>
-            </a:r>
-            <a:r>
-              <a:rPr lang="en-US" altLang="ko-KR" sz="1600" dirty="0" smtClean="0"/>
-              <a:t> </a:t>
-            </a:r>
-            <a:r>
-              <a:rPr lang="ko-KR" altLang="en-US" sz="1600" dirty="0"/>
-              <a:t>실습</a:t>
-            </a:r>
-          </a:p>
-        </p:txBody>
-      </p:sp>
-    </p:spTree>
-    <p:extLst>
-      <p:ext uri="{BB962C8B-B14F-4D97-AF65-F5344CB8AC3E}">
-        <p14:creationId xmlns:p14="http://schemas.microsoft.com/office/powerpoint/2010/main" val="1483215720"/>
-      </p:ext>
-    </p:extLst>
-  </p:cSld>
-  <p:clrMapOvr>
-    <a:masterClrMapping/>
-  </p:clrMapOvr>
-</p:sld>
-</file>
-
-<file path=ppt/slides/slide22.xml><?xml version="1.0" encoding="utf-8"?>
-<p:sld xmlns:a="http://schemas.openxmlformats.org/drawingml/2006/main" xmlns:r="http://schemas.openxmlformats.org/officeDocument/2006/relationships" xmlns:p="http://schemas.openxmlformats.org/presentationml/2006/main">
-  <p:cSld>
-    <p:spTree>
-      <p:nvGrpSpPr>
-        <p:cNvPr id="1" name=""/>
-        <p:cNvGrpSpPr/>
-        <p:nvPr/>
-      </p:nvGrpSpPr>
-      <p:grpSpPr>
-        <a:xfrm>
-          <a:off x="0" y="0"/>
-          <a:ext cx="0" cy="0"/>
-          <a:chOff x="0" y="0"/>
-          <a:chExt cx="0" cy="0"/>
-        </a:xfrm>
-      </p:grpSpPr>
-      <p:sp>
-        <p:nvSpPr>
-          <p:cNvPr id="2" name="제목 1"/>
-          <p:cNvSpPr>
-            <a:spLocks noGrp="1"/>
-          </p:cNvSpPr>
-          <p:nvPr>
-            <p:ph type="title"/>
-          </p:nvPr>
-        </p:nvSpPr>
-        <p:spPr>
-          <a:xfrm>
-            <a:off x="721895" y="0"/>
-            <a:ext cx="9601200" cy="453189"/>
-          </a:xfrm>
-        </p:spPr>
-        <p:txBody>
-          <a:bodyPr>
-            <a:normAutofit/>
-          </a:bodyPr>
-          <a:lstStyle/>
-          <a:p>
-            <a:r>
-              <a:rPr lang="ko-KR" altLang="en-US" sz="1600" dirty="0"/>
-              <a:t>슬라이드 </a:t>
-            </a:r>
-            <a:r>
-              <a:rPr lang="en-US" altLang="ko-KR" sz="1600" dirty="0" smtClean="0"/>
-              <a:t> </a:t>
-            </a:r>
-            <a:r>
-              <a:rPr lang="ko-KR" altLang="en-US" sz="1600" dirty="0"/>
-              <a:t>실습</a:t>
-            </a:r>
-          </a:p>
-        </p:txBody>
-      </p:sp>
-    </p:spTree>
-    <p:extLst>
-      <p:ext uri="{BB962C8B-B14F-4D97-AF65-F5344CB8AC3E}">
-        <p14:creationId xmlns:p14="http://schemas.microsoft.com/office/powerpoint/2010/main" val="1109592946"/>
-      </p:ext>
-    </p:extLst>
-  </p:cSld>
-  <p:clrMapOvr>
-    <a:masterClrMapping/>
-  </p:clrMapOvr>
-</p:sld>
-</file>
-
-<file path=ppt/slides/slide23.xml><?xml version="1.0" encoding="utf-8"?>
-<p:sld xmlns:a="http://schemas.openxmlformats.org/drawingml/2006/main" xmlns:r="http://schemas.openxmlformats.org/officeDocument/2006/relationships" xmlns:p="http://schemas.openxmlformats.org/presentationml/2006/main">
-  <p:cSld>
-    <p:spTree>
-      <p:nvGrpSpPr>
-        <p:cNvPr id="1" name=""/>
-        <p:cNvGrpSpPr/>
-        <p:nvPr/>
-      </p:nvGrpSpPr>
-      <p:grpSpPr>
-        <a:xfrm>
-          <a:off x="0" y="0"/>
-          <a:ext cx="0" cy="0"/>
-          <a:chOff x="0" y="0"/>
-          <a:chExt cx="0" cy="0"/>
-        </a:xfrm>
-      </p:grpSpPr>
-      <p:sp>
-        <p:nvSpPr>
-          <p:cNvPr id="2" name="제목 1"/>
-          <p:cNvSpPr>
-            <a:spLocks noGrp="1"/>
-          </p:cNvSpPr>
-          <p:nvPr>
-            <p:ph type="title"/>
-          </p:nvPr>
-        </p:nvSpPr>
-        <p:spPr>
-          <a:xfrm>
-            <a:off x="721895" y="0"/>
-            <a:ext cx="9601200" cy="453189"/>
-          </a:xfrm>
-        </p:spPr>
-        <p:txBody>
-          <a:bodyPr>
-            <a:normAutofit/>
-          </a:bodyPr>
-          <a:lstStyle/>
-          <a:p>
-            <a:r>
-              <a:rPr lang="ko-KR" altLang="en-US" sz="1600" dirty="0"/>
-              <a:t>슬라이드 </a:t>
-            </a:r>
-            <a:r>
-              <a:rPr lang="en-US" altLang="ko-KR" sz="1600" dirty="0" smtClean="0"/>
-              <a:t> </a:t>
-            </a:r>
-            <a:r>
-              <a:rPr lang="ko-KR" altLang="en-US" sz="1600" dirty="0"/>
-              <a:t>실습</a:t>
-            </a:r>
-          </a:p>
-        </p:txBody>
-      </p:sp>
-    </p:spTree>
-    <p:extLst>
-      <p:ext uri="{BB962C8B-B14F-4D97-AF65-F5344CB8AC3E}">
-        <p14:creationId xmlns:p14="http://schemas.microsoft.com/office/powerpoint/2010/main" val="4092244528"/>
-      </p:ext>
-    </p:extLst>
-  </p:cSld>
-  <p:clrMapOvr>
-    <a:masterClrMapping/>
-  </p:clrMapOvr>
-</p:sld>
-</file>
-
-<file path=ppt/slides/slide24.xml><?xml version="1.0" encoding="utf-8"?>
-<p:sld xmlns:a="http://schemas.openxmlformats.org/drawingml/2006/main" xmlns:r="http://schemas.openxmlformats.org/officeDocument/2006/relationships" xmlns:p="http://schemas.openxmlformats.org/presentationml/2006/main">
-  <p:cSld>
-    <p:spTree>
-      <p:nvGrpSpPr>
-        <p:cNvPr id="1" name=""/>
-        <p:cNvGrpSpPr/>
-        <p:nvPr/>
-      </p:nvGrpSpPr>
-      <p:grpSpPr>
-        <a:xfrm>
-          <a:off x="0" y="0"/>
-          <a:ext cx="0" cy="0"/>
-          <a:chOff x="0" y="0"/>
-          <a:chExt cx="0" cy="0"/>
-        </a:xfrm>
-      </p:grpSpPr>
-      <p:sp>
-        <p:nvSpPr>
-          <p:cNvPr id="2" name="제목 1"/>
-          <p:cNvSpPr>
-            <a:spLocks noGrp="1"/>
-          </p:cNvSpPr>
-          <p:nvPr>
-            <p:ph type="title"/>
-          </p:nvPr>
-        </p:nvSpPr>
-        <p:spPr>
-          <a:xfrm>
-            <a:off x="721895" y="0"/>
-            <a:ext cx="9601200" cy="453189"/>
-          </a:xfrm>
-        </p:spPr>
-        <p:txBody>
-          <a:bodyPr>
-            <a:normAutofit/>
-          </a:bodyPr>
-          <a:lstStyle/>
-          <a:p>
-            <a:r>
-              <a:rPr lang="ko-KR" altLang="en-US" sz="1600" dirty="0"/>
-              <a:t>슬라이드 </a:t>
-            </a:r>
-            <a:r>
-              <a:rPr lang="en-US" altLang="ko-KR" sz="1600" dirty="0" smtClean="0"/>
-              <a:t> </a:t>
-            </a:r>
-            <a:r>
-              <a:rPr lang="ko-KR" altLang="en-US" sz="1600" dirty="0"/>
-              <a:t>실습</a:t>
-            </a:r>
-          </a:p>
-        </p:txBody>
-      </p:sp>
-    </p:spTree>
-    <p:extLst>
-      <p:ext uri="{BB962C8B-B14F-4D97-AF65-F5344CB8AC3E}">
-        <p14:creationId xmlns:p14="http://schemas.microsoft.com/office/powerpoint/2010/main" val="3218084244"/>
-      </p:ext>
-    </p:extLst>
-  </p:cSld>
-  <p:clrMapOvr>
-    <a:masterClrMapping/>
-  </p:clrMapOvr>
-</p:sld>
-</file>
-
-<file path=ppt/slides/slide25.xml><?xml version="1.0" encoding="utf-8"?>
-<p:sld xmlns:a="http://schemas.openxmlformats.org/drawingml/2006/main" xmlns:r="http://schemas.openxmlformats.org/officeDocument/2006/relationships" xmlns:p="http://schemas.openxmlformats.org/presentationml/2006/main">
-  <p:cSld>
-    <p:spTree>
-      <p:nvGrpSpPr>
-        <p:cNvPr id="1" name=""/>
-        <p:cNvGrpSpPr/>
-        <p:nvPr/>
-      </p:nvGrpSpPr>
-      <p:grpSpPr>
-        <a:xfrm>
-          <a:off x="0" y="0"/>
-          <a:ext cx="0" cy="0"/>
-          <a:chOff x="0" y="0"/>
-          <a:chExt cx="0" cy="0"/>
-        </a:xfrm>
-      </p:grpSpPr>
-      <p:sp>
-        <p:nvSpPr>
-          <p:cNvPr id="2" name="제목 1"/>
-          <p:cNvSpPr>
-            <a:spLocks noGrp="1"/>
-          </p:cNvSpPr>
-          <p:nvPr>
-            <p:ph type="title"/>
-          </p:nvPr>
-        </p:nvSpPr>
-        <p:spPr>
-          <a:xfrm>
-            <a:off x="721895" y="0"/>
-            <a:ext cx="9601200" cy="453189"/>
-          </a:xfrm>
-        </p:spPr>
-        <p:txBody>
-          <a:bodyPr>
-            <a:normAutofit/>
-          </a:bodyPr>
-          <a:lstStyle/>
-          <a:p>
-            <a:r>
-              <a:rPr lang="ko-KR" altLang="en-US" sz="1600" dirty="0"/>
-              <a:t>슬라이드 </a:t>
-            </a:r>
-            <a:r>
-              <a:rPr lang="en-US" altLang="ko-KR" sz="1600" dirty="0" smtClean="0"/>
-              <a:t> </a:t>
-            </a:r>
-            <a:r>
-              <a:rPr lang="ko-KR" altLang="en-US" sz="1600" dirty="0"/>
-              <a:t>실습</a:t>
-            </a:r>
-          </a:p>
-        </p:txBody>
-      </p:sp>
-    </p:spTree>
-    <p:extLst>
-      <p:ext uri="{BB962C8B-B14F-4D97-AF65-F5344CB8AC3E}">
-        <p14:creationId xmlns:p14="http://schemas.microsoft.com/office/powerpoint/2010/main" val="2424372319"/>
-      </p:ext>
-    </p:extLst>
-  </p:cSld>
-  <p:clrMapOvr>
-    <a:masterClrMapping/>
-  </p:clrMapOvr>
-</p:sld>
-</file>
-
-<file path=ppt/slides/slide26.xml><?xml version="1.0" encoding="utf-8"?>
-<p:sld xmlns:a="http://schemas.openxmlformats.org/drawingml/2006/main" xmlns:r="http://schemas.openxmlformats.org/officeDocument/2006/relationships" xmlns:p="http://schemas.openxmlformats.org/presentationml/2006/main">
-  <p:cSld>
-    <p:spTree>
-      <p:nvGrpSpPr>
-        <p:cNvPr id="1" name=""/>
-        <p:cNvGrpSpPr/>
-        <p:nvPr/>
-      </p:nvGrpSpPr>
-      <p:grpSpPr>
-        <a:xfrm>
-          <a:off x="0" y="0"/>
-          <a:ext cx="0" cy="0"/>
-          <a:chOff x="0" y="0"/>
-          <a:chExt cx="0" cy="0"/>
-        </a:xfrm>
-      </p:grpSpPr>
-      <p:sp>
-        <p:nvSpPr>
-          <p:cNvPr id="2" name="제목 1"/>
-          <p:cNvSpPr>
-            <a:spLocks noGrp="1"/>
-          </p:cNvSpPr>
-          <p:nvPr>
-            <p:ph type="title"/>
-          </p:nvPr>
-        </p:nvSpPr>
-        <p:spPr>
-          <a:xfrm>
-            <a:off x="721895" y="0"/>
-            <a:ext cx="9601200" cy="453189"/>
-          </a:xfrm>
-        </p:spPr>
-        <p:txBody>
-          <a:bodyPr>
-            <a:normAutofit/>
-          </a:bodyPr>
-          <a:lstStyle/>
-          <a:p>
-            <a:r>
-              <a:rPr lang="ko-KR" altLang="en-US" sz="1600" dirty="0"/>
-              <a:t>슬라이드 </a:t>
-            </a:r>
-            <a:r>
-              <a:rPr lang="en-US" altLang="ko-KR" sz="1600" dirty="0" smtClean="0"/>
-              <a:t> </a:t>
-            </a:r>
-            <a:r>
-              <a:rPr lang="ko-KR" altLang="en-US" sz="1600" dirty="0"/>
-              <a:t>실습</a:t>
-            </a:r>
-          </a:p>
-        </p:txBody>
-      </p:sp>
-    </p:spTree>
-    <p:extLst>
-      <p:ext uri="{BB962C8B-B14F-4D97-AF65-F5344CB8AC3E}">
-        <p14:creationId xmlns:p14="http://schemas.microsoft.com/office/powerpoint/2010/main" val="2747862642"/>
-      </p:ext>
-    </p:extLst>
-  </p:cSld>
-  <p:clrMapOvr>
-    <a:masterClrMapping/>
-  </p:clrMapOvr>
-</p:sld>
-</file>
-
-<file path=ppt/slides/slide27.xml><?xml version="1.0" encoding="utf-8"?>
-<p:sld xmlns:a="http://schemas.openxmlformats.org/drawingml/2006/main" xmlns:r="http://schemas.openxmlformats.org/officeDocument/2006/relationships" xmlns:p="http://schemas.openxmlformats.org/presentationml/2006/main">
-  <p:cSld>
-    <p:spTree>
-      <p:nvGrpSpPr>
-        <p:cNvPr id="1" name=""/>
-        <p:cNvGrpSpPr/>
-        <p:nvPr/>
-      </p:nvGrpSpPr>
-      <p:grpSpPr>
-        <a:xfrm>
-          <a:off x="0" y="0"/>
-          <a:ext cx="0" cy="0"/>
-          <a:chOff x="0" y="0"/>
-          <a:chExt cx="0" cy="0"/>
-        </a:xfrm>
-      </p:grpSpPr>
-      <p:sp>
-        <p:nvSpPr>
-          <p:cNvPr id="2" name="제목 1"/>
-          <p:cNvSpPr>
-            <a:spLocks noGrp="1"/>
-          </p:cNvSpPr>
-          <p:nvPr>
-            <p:ph type="title"/>
-          </p:nvPr>
-        </p:nvSpPr>
-        <p:spPr>
-          <a:xfrm>
-            <a:off x="721895" y="0"/>
-            <a:ext cx="9601200" cy="453189"/>
-          </a:xfrm>
-        </p:spPr>
-        <p:txBody>
-          <a:bodyPr>
-            <a:normAutofit/>
-          </a:bodyPr>
-          <a:lstStyle/>
-          <a:p>
-            <a:r>
-              <a:rPr lang="ko-KR" altLang="en-US" sz="1600" dirty="0"/>
-              <a:t>슬라이드 </a:t>
-            </a:r>
-            <a:r>
-              <a:rPr lang="en-US" altLang="ko-KR" sz="1600" dirty="0" smtClean="0"/>
-              <a:t> </a:t>
-            </a:r>
-            <a:r>
-              <a:rPr lang="ko-KR" altLang="en-US" sz="1600" dirty="0"/>
-              <a:t>실습</a:t>
-            </a:r>
-          </a:p>
-        </p:txBody>
-      </p:sp>
-    </p:spTree>
-    <p:extLst>
-      <p:ext uri="{BB962C8B-B14F-4D97-AF65-F5344CB8AC3E}">
-        <p14:creationId xmlns:p14="http://schemas.microsoft.com/office/powerpoint/2010/main" val="1966062502"/>
       </p:ext>
     </p:extLst>
   </p:cSld>
@@ -5211,8 +5772,8 @@
               <a:t>슬라이드 </a:t>
             </a:r>
             <a:r>
-              <a:rPr lang="en-US" altLang="ko-KR" sz="1600" dirty="0" smtClean="0"/>
-              <a:t> </a:t>
+              <a:rPr lang="en-US" altLang="ko-KR" sz="1600" dirty="0"/>
+              <a:t>8 </a:t>
             </a:r>
             <a:r>
               <a:rPr lang="ko-KR" altLang="en-US" sz="1600" dirty="0"/>
@@ -5221,6 +5782,96 @@
           </a:p>
         </p:txBody>
       </p:sp>
+      <p:pic>
+        <p:nvPicPr>
+          <p:cNvPr id="4" name="그림 3">
+            <a:extLst>
+              <a:ext uri="{FF2B5EF4-FFF2-40B4-BE49-F238E27FC236}">
+                <a16:creationId xmlns:a16="http://schemas.microsoft.com/office/drawing/2014/main" id="{F3CB14B8-1A98-68C7-7D86-8428AC992B5D}"/>
+              </a:ext>
+            </a:extLst>
+          </p:cNvPr>
+          <p:cNvPicPr>
+            <a:picLocks noChangeAspect="1"/>
+          </p:cNvPicPr>
+          <p:nvPr/>
+        </p:nvPicPr>
+        <p:blipFill>
+          <a:blip r:embed="rId2"/>
+          <a:stretch>
+            <a:fillRect/>
+          </a:stretch>
+        </p:blipFill>
+        <p:spPr>
+          <a:xfrm>
+            <a:off x="721895" y="1135717"/>
+            <a:ext cx="4628968" cy="4586565"/>
+          </a:xfrm>
+          <a:prstGeom prst="rect">
+            <a:avLst/>
+          </a:prstGeom>
+        </p:spPr>
+      </p:pic>
+      <p:pic>
+        <p:nvPicPr>
+          <p:cNvPr id="6" name="그림 5">
+            <a:extLst>
+              <a:ext uri="{FF2B5EF4-FFF2-40B4-BE49-F238E27FC236}">
+                <a16:creationId xmlns:a16="http://schemas.microsoft.com/office/drawing/2014/main" id="{C2486566-D9EA-262E-51AB-4A6DBF1789E2}"/>
+              </a:ext>
+            </a:extLst>
+          </p:cNvPr>
+          <p:cNvPicPr>
+            <a:picLocks noChangeAspect="1"/>
+          </p:cNvPicPr>
+          <p:nvPr/>
+        </p:nvPicPr>
+        <p:blipFill>
+          <a:blip r:embed="rId3"/>
+          <a:stretch>
+            <a:fillRect/>
+          </a:stretch>
+        </p:blipFill>
+        <p:spPr>
+          <a:xfrm>
+            <a:off x="6841139" y="1586836"/>
+            <a:ext cx="4191215" cy="1124008"/>
+          </a:xfrm>
+          <a:prstGeom prst="rect">
+            <a:avLst/>
+          </a:prstGeom>
+        </p:spPr>
+      </p:pic>
+      <p:pic>
+        <p:nvPicPr>
+          <p:cNvPr id="8" name="그림 7">
+            <a:extLst>
+              <a:ext uri="{FF2B5EF4-FFF2-40B4-BE49-F238E27FC236}">
+                <a16:creationId xmlns:a16="http://schemas.microsoft.com/office/drawing/2014/main" id="{17F580C3-907A-FC97-8230-274AAEF016D5}"/>
+              </a:ext>
+            </a:extLst>
+          </p:cNvPr>
+          <p:cNvPicPr>
+            <a:picLocks noChangeAspect="1"/>
+          </p:cNvPicPr>
+          <p:nvPr/>
+        </p:nvPicPr>
+        <p:blipFill>
+          <a:blip r:embed="rId4"/>
+          <a:stretch>
+            <a:fillRect/>
+          </a:stretch>
+        </p:blipFill>
+        <p:spPr>
+          <a:xfrm>
+            <a:off x="6637928" y="3912194"/>
+            <a:ext cx="4597636" cy="1358970"/>
+          </a:xfrm>
+          <a:prstGeom prst="rect">
+            <a:avLst/>
+          </a:prstGeom>
+        </p:spPr>
+      </p:pic>
     </p:spTree>
     <p:extLst>
       <p:ext uri="{BB962C8B-B14F-4D97-AF65-F5344CB8AC3E}">
@@ -5278,8 +5929,8 @@
               <a:t>슬라이드 </a:t>
             </a:r>
             <a:r>
-              <a:rPr lang="en-US" altLang="ko-KR" sz="1600" dirty="0" smtClean="0"/>
-              <a:t> </a:t>
+              <a:rPr lang="en-US" altLang="ko-KR" sz="1600" dirty="0"/>
+              <a:t>9 </a:t>
             </a:r>
             <a:r>
               <a:rPr lang="ko-KR" altLang="en-US" sz="1600" dirty="0"/>
@@ -5288,6 +5939,96 @@
           </a:p>
         </p:txBody>
       </p:sp>
+      <p:pic>
+        <p:nvPicPr>
+          <p:cNvPr id="4" name="그림 3">
+            <a:extLst>
+              <a:ext uri="{FF2B5EF4-FFF2-40B4-BE49-F238E27FC236}">
+                <a16:creationId xmlns:a16="http://schemas.microsoft.com/office/drawing/2014/main" id="{10DF8957-2FCB-EA1B-DF7E-FC99D7419C83}"/>
+              </a:ext>
+            </a:extLst>
+          </p:cNvPr>
+          <p:cNvPicPr>
+            <a:picLocks noChangeAspect="1"/>
+          </p:cNvPicPr>
+          <p:nvPr/>
+        </p:nvPicPr>
+        <p:blipFill>
+          <a:blip r:embed="rId2"/>
+          <a:stretch>
+            <a:fillRect/>
+          </a:stretch>
+        </p:blipFill>
+        <p:spPr>
+          <a:xfrm>
+            <a:off x="721895" y="1296248"/>
+            <a:ext cx="5140859" cy="4265504"/>
+          </a:xfrm>
+          <a:prstGeom prst="rect">
+            <a:avLst/>
+          </a:prstGeom>
+        </p:spPr>
+      </p:pic>
+      <p:pic>
+        <p:nvPicPr>
+          <p:cNvPr id="6" name="그림 5">
+            <a:extLst>
+              <a:ext uri="{FF2B5EF4-FFF2-40B4-BE49-F238E27FC236}">
+                <a16:creationId xmlns:a16="http://schemas.microsoft.com/office/drawing/2014/main" id="{4DB34888-EE8E-5AB5-1972-7CD27B9083BF}"/>
+              </a:ext>
+            </a:extLst>
+          </p:cNvPr>
+          <p:cNvPicPr>
+            <a:picLocks noChangeAspect="1"/>
+          </p:cNvPicPr>
+          <p:nvPr/>
+        </p:nvPicPr>
+        <p:blipFill>
+          <a:blip r:embed="rId3"/>
+          <a:stretch>
+            <a:fillRect/>
+          </a:stretch>
+        </p:blipFill>
+        <p:spPr>
+          <a:xfrm>
+            <a:off x="7379418" y="1686589"/>
+            <a:ext cx="3518081" cy="1124008"/>
+          </a:xfrm>
+          <a:prstGeom prst="rect">
+            <a:avLst/>
+          </a:prstGeom>
+        </p:spPr>
+      </p:pic>
+      <p:pic>
+        <p:nvPicPr>
+          <p:cNvPr id="8" name="그림 7">
+            <a:extLst>
+              <a:ext uri="{FF2B5EF4-FFF2-40B4-BE49-F238E27FC236}">
+                <a16:creationId xmlns:a16="http://schemas.microsoft.com/office/drawing/2014/main" id="{10E135A7-1A0F-9872-9298-CCFDF8DA0E9D}"/>
+              </a:ext>
+            </a:extLst>
+          </p:cNvPr>
+          <p:cNvPicPr>
+            <a:picLocks noChangeAspect="1"/>
+          </p:cNvPicPr>
+          <p:nvPr/>
+        </p:nvPicPr>
+        <p:blipFill>
+          <a:blip r:embed="rId4"/>
+          <a:stretch>
+            <a:fillRect/>
+          </a:stretch>
+        </p:blipFill>
+        <p:spPr>
+          <a:xfrm>
+            <a:off x="7363542" y="4009301"/>
+            <a:ext cx="3549832" cy="1162110"/>
+          </a:xfrm>
+          <a:prstGeom prst="rect">
+            <a:avLst/>
+          </a:prstGeom>
+        </p:spPr>
+      </p:pic>
     </p:spTree>
     <p:extLst>
       <p:ext uri="{BB962C8B-B14F-4D97-AF65-F5344CB8AC3E}">
@@ -5345,8 +6086,8 @@
               <a:t>슬라이드 </a:t>
             </a:r>
             <a:r>
-              <a:rPr lang="en-US" altLang="ko-KR" sz="1600" dirty="0" smtClean="0"/>
-              <a:t> </a:t>
+              <a:rPr lang="en-US" altLang="ko-KR" sz="1600" dirty="0"/>
+              <a:t>10 </a:t>
             </a:r>
             <a:r>
               <a:rPr lang="ko-KR" altLang="en-US" sz="1600" dirty="0"/>
@@ -5355,6 +6096,96 @@
           </a:p>
         </p:txBody>
       </p:sp>
+      <p:pic>
+        <p:nvPicPr>
+          <p:cNvPr id="4" name="그림 3">
+            <a:extLst>
+              <a:ext uri="{FF2B5EF4-FFF2-40B4-BE49-F238E27FC236}">
+                <a16:creationId xmlns:a16="http://schemas.microsoft.com/office/drawing/2014/main" id="{2D143CEA-74B7-2B19-045D-CE99973F9053}"/>
+              </a:ext>
+            </a:extLst>
+          </p:cNvPr>
+          <p:cNvPicPr>
+            <a:picLocks noChangeAspect="1"/>
+          </p:cNvPicPr>
+          <p:nvPr/>
+        </p:nvPicPr>
+        <p:blipFill>
+          <a:blip r:embed="rId2"/>
+          <a:stretch>
+            <a:fillRect/>
+          </a:stretch>
+        </p:blipFill>
+        <p:spPr>
+          <a:xfrm>
+            <a:off x="8142646" y="1796441"/>
+            <a:ext cx="2813195" cy="1206562"/>
+          </a:xfrm>
+          <a:prstGeom prst="rect">
+            <a:avLst/>
+          </a:prstGeom>
+        </p:spPr>
+      </p:pic>
+      <p:pic>
+        <p:nvPicPr>
+          <p:cNvPr id="6" name="그림 5">
+            <a:extLst>
+              <a:ext uri="{FF2B5EF4-FFF2-40B4-BE49-F238E27FC236}">
+                <a16:creationId xmlns:a16="http://schemas.microsoft.com/office/drawing/2014/main" id="{3FDDB9ED-557F-9581-4548-EDE7DD00A6E1}"/>
+              </a:ext>
+            </a:extLst>
+          </p:cNvPr>
+          <p:cNvPicPr>
+            <a:picLocks noChangeAspect="1"/>
+          </p:cNvPicPr>
+          <p:nvPr/>
+        </p:nvPicPr>
+        <p:blipFill>
+          <a:blip r:embed="rId3"/>
+          <a:stretch>
+            <a:fillRect/>
+          </a:stretch>
+        </p:blipFill>
+        <p:spPr>
+          <a:xfrm>
+            <a:off x="8142646" y="3854997"/>
+            <a:ext cx="2851297" cy="1143059"/>
+          </a:xfrm>
+          <a:prstGeom prst="rect">
+            <a:avLst/>
+          </a:prstGeom>
+        </p:spPr>
+      </p:pic>
+      <p:pic>
+        <p:nvPicPr>
+          <p:cNvPr id="8" name="그림 7">
+            <a:extLst>
+              <a:ext uri="{FF2B5EF4-FFF2-40B4-BE49-F238E27FC236}">
+                <a16:creationId xmlns:a16="http://schemas.microsoft.com/office/drawing/2014/main" id="{4A8C23D8-E74A-B24C-9D07-3B2B8BDE7287}"/>
+              </a:ext>
+            </a:extLst>
+          </p:cNvPr>
+          <p:cNvPicPr>
+            <a:picLocks noChangeAspect="1"/>
+          </p:cNvPicPr>
+          <p:nvPr/>
+        </p:nvPicPr>
+        <p:blipFill>
+          <a:blip r:embed="rId4"/>
+          <a:stretch>
+            <a:fillRect/>
+          </a:stretch>
+        </p:blipFill>
+        <p:spPr>
+          <a:xfrm>
+            <a:off x="721895" y="1347115"/>
+            <a:ext cx="5425518" cy="4163770"/>
+          </a:xfrm>
+          <a:prstGeom prst="rect">
+            <a:avLst/>
+          </a:prstGeom>
+        </p:spPr>
+      </p:pic>
     </p:spTree>
     <p:extLst>
       <p:ext uri="{BB962C8B-B14F-4D97-AF65-F5344CB8AC3E}">
@@ -5412,13 +6243,109 @@
               <a:t>슬라이드 </a:t>
             </a:r>
             <a:r>
-              <a:rPr lang="en-US" altLang="ko-KR" sz="1600" dirty="0" smtClean="0"/>
-              <a:t> </a:t>
+              <a:rPr lang="en-US" altLang="ko-KR" sz="1600" dirty="0"/>
+              <a:t>13 </a:t>
             </a:r>
             <a:r>
               <a:rPr lang="ko-KR" altLang="en-US" sz="1600" dirty="0"/>
               <a:t>실습</a:t>
             </a:r>
+          </a:p>
+        </p:txBody>
+      </p:sp>
+      <p:pic>
+        <p:nvPicPr>
+          <p:cNvPr id="4" name="그림 3">
+            <a:extLst>
+              <a:ext uri="{FF2B5EF4-FFF2-40B4-BE49-F238E27FC236}">
+                <a16:creationId xmlns:a16="http://schemas.microsoft.com/office/drawing/2014/main" id="{D921F462-CB6B-460C-4B3A-FB98A3E8DDEC}"/>
+              </a:ext>
+            </a:extLst>
+          </p:cNvPr>
+          <p:cNvPicPr>
+            <a:picLocks noChangeAspect="1"/>
+          </p:cNvPicPr>
+          <p:nvPr/>
+        </p:nvPicPr>
+        <p:blipFill>
+          <a:blip r:embed="rId2"/>
+          <a:stretch>
+            <a:fillRect/>
+          </a:stretch>
+        </p:blipFill>
+        <p:spPr>
+          <a:xfrm>
+            <a:off x="721895" y="1751618"/>
+            <a:ext cx="4731076" cy="3354763"/>
+          </a:xfrm>
+          <a:prstGeom prst="rect">
+            <a:avLst/>
+          </a:prstGeom>
+        </p:spPr>
+      </p:pic>
+      <p:pic>
+        <p:nvPicPr>
+          <p:cNvPr id="6" name="그림 5">
+            <a:extLst>
+              <a:ext uri="{FF2B5EF4-FFF2-40B4-BE49-F238E27FC236}">
+                <a16:creationId xmlns:a16="http://schemas.microsoft.com/office/drawing/2014/main" id="{1E16C46B-05B6-3F31-DAED-8BD80E94C2A0}"/>
+              </a:ext>
+            </a:extLst>
+          </p:cNvPr>
+          <p:cNvPicPr>
+            <a:picLocks noChangeAspect="1"/>
+          </p:cNvPicPr>
+          <p:nvPr/>
+        </p:nvPicPr>
+        <p:blipFill>
+          <a:blip r:embed="rId3"/>
+          <a:stretch>
+            <a:fillRect/>
+          </a:stretch>
+        </p:blipFill>
+        <p:spPr>
+          <a:xfrm>
+            <a:off x="8165812" y="2833455"/>
+            <a:ext cx="2157283" cy="1191087"/>
+          </a:xfrm>
+          <a:prstGeom prst="rect">
+            <a:avLst/>
+          </a:prstGeom>
+        </p:spPr>
+      </p:pic>
+      <p:sp>
+        <p:nvSpPr>
+          <p:cNvPr id="7" name="TextBox 6">
+            <a:extLst>
+              <a:ext uri="{FF2B5EF4-FFF2-40B4-BE49-F238E27FC236}">
+                <a16:creationId xmlns:a16="http://schemas.microsoft.com/office/drawing/2014/main" id="{5355FF44-2B68-D8CD-4357-39749DF5C6BA}"/>
+              </a:ext>
+            </a:extLst>
+          </p:cNvPr>
+          <p:cNvSpPr txBox="1"/>
+          <p:nvPr/>
+        </p:nvSpPr>
+        <p:spPr>
+          <a:xfrm>
+            <a:off x="8544025" y="4488872"/>
+            <a:ext cx="2926080" cy="369332"/>
+          </a:xfrm>
+          <a:prstGeom prst="rect">
+            <a:avLst/>
+          </a:prstGeom>
+          <a:noFill/>
+        </p:spPr>
+        <p:txBody>
+          <a:bodyPr wrap="square" rtlCol="0">
+            <a:spAutoFit/>
+          </a:bodyPr>
+          <a:lstStyle/>
+          <a:p>
+            <a:r>
+              <a:rPr lang="ko-KR" altLang="en-US"/>
+              <a:t>평상시 모습</a:t>
+            </a:r>
+            <a:endParaRPr lang="ko-KR" altLang="en-US" dirty="0"/>
           </a:p>
         </p:txBody>
       </p:sp>
@@ -5479,12 +6406,150 @@
               <a:t>슬라이드 </a:t>
             </a:r>
             <a:r>
-              <a:rPr lang="en-US" altLang="ko-KR" sz="1600" dirty="0" smtClean="0"/>
-              <a:t> </a:t>
+              <a:rPr lang="en-US" altLang="ko-KR" sz="1600" dirty="0"/>
+              <a:t>13 </a:t>
             </a:r>
             <a:r>
               <a:rPr lang="ko-KR" altLang="en-US" sz="1600" dirty="0"/>
               <a:t>실습</a:t>
+            </a:r>
+          </a:p>
+        </p:txBody>
+      </p:sp>
+      <p:pic>
+        <p:nvPicPr>
+          <p:cNvPr id="5" name="그림 4">
+            <a:extLst>
+              <a:ext uri="{FF2B5EF4-FFF2-40B4-BE49-F238E27FC236}">
+                <a16:creationId xmlns:a16="http://schemas.microsoft.com/office/drawing/2014/main" id="{D9EB365F-8BC7-B2A2-63D0-AE813D12FEE9}"/>
+              </a:ext>
+            </a:extLst>
+          </p:cNvPr>
+          <p:cNvPicPr>
+            <a:picLocks noChangeAspect="1"/>
+          </p:cNvPicPr>
+          <p:nvPr/>
+        </p:nvPicPr>
+        <p:blipFill>
+          <a:blip r:embed="rId2"/>
+          <a:stretch>
+            <a:fillRect/>
+          </a:stretch>
+        </p:blipFill>
+        <p:spPr>
+          <a:xfrm>
+            <a:off x="721895" y="2197037"/>
+            <a:ext cx="4298583" cy="1244664"/>
+          </a:xfrm>
+          <a:prstGeom prst="rect">
+            <a:avLst/>
+          </a:prstGeom>
+        </p:spPr>
+      </p:pic>
+      <p:pic>
+        <p:nvPicPr>
+          <p:cNvPr id="7" name="그림 6">
+            <a:extLst>
+              <a:ext uri="{FF2B5EF4-FFF2-40B4-BE49-F238E27FC236}">
+                <a16:creationId xmlns:a16="http://schemas.microsoft.com/office/drawing/2014/main" id="{1C8668C1-6F08-F2B2-619E-2179420D880D}"/>
+              </a:ext>
+            </a:extLst>
+          </p:cNvPr>
+          <p:cNvPicPr>
+            <a:picLocks noChangeAspect="1"/>
+          </p:cNvPicPr>
+          <p:nvPr/>
+        </p:nvPicPr>
+        <p:blipFill>
+          <a:blip r:embed="rId3"/>
+          <a:stretch>
+            <a:fillRect/>
+          </a:stretch>
+        </p:blipFill>
+        <p:spPr>
+          <a:xfrm>
+            <a:off x="7220991" y="2197037"/>
+            <a:ext cx="4267419" cy="1244664"/>
+          </a:xfrm>
+          <a:prstGeom prst="rect">
+            <a:avLst/>
+          </a:prstGeom>
+        </p:spPr>
+      </p:pic>
+      <p:sp>
+        <p:nvSpPr>
+          <p:cNvPr id="8" name="TextBox 7">
+            <a:extLst>
+              <a:ext uri="{FF2B5EF4-FFF2-40B4-BE49-F238E27FC236}">
+                <a16:creationId xmlns:a16="http://schemas.microsoft.com/office/drawing/2014/main" id="{89BB9A3A-7450-2B2D-BA7E-7BC26BC7F2E1}"/>
+              </a:ext>
+            </a:extLst>
+          </p:cNvPr>
+          <p:cNvSpPr txBox="1"/>
+          <p:nvPr/>
+        </p:nvSpPr>
+        <p:spPr>
+          <a:xfrm>
+            <a:off x="1264321" y="3956858"/>
+            <a:ext cx="3213730" cy="646331"/>
+          </a:xfrm>
+          <a:prstGeom prst="rect">
+            <a:avLst/>
+          </a:prstGeom>
+          <a:noFill/>
+        </p:spPr>
+        <p:txBody>
+          <a:bodyPr wrap="square" rtlCol="0">
+            <a:spAutoFit/>
+          </a:bodyPr>
+          <a:lstStyle/>
+          <a:p>
+            <a:r>
+              <a:rPr lang="ko-KR" altLang="en-US" dirty="0"/>
+              <a:t>버튼 태그에 </a:t>
+            </a:r>
+            <a:r>
+              <a:rPr lang="ko-KR" altLang="en-US"/>
+              <a:t>마우스 올리면 해당 창 출력</a:t>
+            </a:r>
+          </a:p>
+        </p:txBody>
+      </p:sp>
+      <p:sp>
+        <p:nvSpPr>
+          <p:cNvPr id="9" name="TextBox 8">
+            <a:extLst>
+              <a:ext uri="{FF2B5EF4-FFF2-40B4-BE49-F238E27FC236}">
+                <a16:creationId xmlns:a16="http://schemas.microsoft.com/office/drawing/2014/main" id="{8D7DA627-BF0E-DA6E-EA76-1E6190242FD0}"/>
+              </a:ext>
+            </a:extLst>
+          </p:cNvPr>
+          <p:cNvSpPr txBox="1"/>
+          <p:nvPr/>
+        </p:nvSpPr>
+        <p:spPr>
+          <a:xfrm>
+            <a:off x="7747835" y="3956857"/>
+            <a:ext cx="3213730" cy="646331"/>
+          </a:xfrm>
+          <a:prstGeom prst="rect">
+            <a:avLst/>
+          </a:prstGeom>
+          <a:noFill/>
+        </p:spPr>
+        <p:txBody>
+          <a:bodyPr wrap="square" rtlCol="0">
+            <a:spAutoFit/>
+          </a:bodyPr>
+          <a:lstStyle/>
+          <a:p>
+            <a:r>
+              <a:rPr lang="en-US" altLang="ko-KR" dirty="0"/>
+              <a:t>p</a:t>
+            </a:r>
+            <a:r>
+              <a:rPr lang="ko-KR" altLang="en-US" dirty="0"/>
+              <a:t> 태그에 마우스 올리면 해당 창 출력</a:t>
             </a:r>
           </a:p>
         </p:txBody>
@@ -5546,8 +6611,8 @@
               <a:t>슬라이드 </a:t>
             </a:r>
             <a:r>
-              <a:rPr lang="en-US" altLang="ko-KR" sz="1600" dirty="0" smtClean="0"/>
-              <a:t> </a:t>
+              <a:rPr lang="en-US" altLang="ko-KR" sz="1600" dirty="0"/>
+              <a:t>15 </a:t>
             </a:r>
             <a:r>
               <a:rPr lang="ko-KR" altLang="en-US" sz="1600" dirty="0"/>
@@ -5556,6 +6621,66 @@
           </a:p>
         </p:txBody>
       </p:sp>
+      <p:pic>
+        <p:nvPicPr>
+          <p:cNvPr id="4" name="그림 3">
+            <a:extLst>
+              <a:ext uri="{FF2B5EF4-FFF2-40B4-BE49-F238E27FC236}">
+                <a16:creationId xmlns:a16="http://schemas.microsoft.com/office/drawing/2014/main" id="{CF215C3F-C8BD-0D6D-B097-93A30B3E94A3}"/>
+              </a:ext>
+            </a:extLst>
+          </p:cNvPr>
+          <p:cNvPicPr>
+            <a:picLocks noChangeAspect="1"/>
+          </p:cNvPicPr>
+          <p:nvPr/>
+        </p:nvPicPr>
+        <p:blipFill>
+          <a:blip r:embed="rId2"/>
+          <a:stretch>
+            <a:fillRect/>
+          </a:stretch>
+        </p:blipFill>
+        <p:spPr>
+          <a:xfrm>
+            <a:off x="721895" y="1777964"/>
+            <a:ext cx="6288945" cy="3302072"/>
+          </a:xfrm>
+          <a:prstGeom prst="rect">
+            <a:avLst/>
+          </a:prstGeom>
+        </p:spPr>
+      </p:pic>
+      <p:pic>
+        <p:nvPicPr>
+          <p:cNvPr id="6" name="그림 5">
+            <a:extLst>
+              <a:ext uri="{FF2B5EF4-FFF2-40B4-BE49-F238E27FC236}">
+                <a16:creationId xmlns:a16="http://schemas.microsoft.com/office/drawing/2014/main" id="{8893EB43-7C74-CDDF-909B-CC9E167697BF}"/>
+              </a:ext>
+            </a:extLst>
+          </p:cNvPr>
+          <p:cNvPicPr>
+            <a:picLocks noChangeAspect="1"/>
+          </p:cNvPicPr>
+          <p:nvPr/>
+        </p:nvPicPr>
+        <p:blipFill>
+          <a:blip r:embed="rId3"/>
+          <a:stretch>
+            <a:fillRect/>
+          </a:stretch>
+        </p:blipFill>
+        <p:spPr>
+          <a:xfrm>
+            <a:off x="8099345" y="2692362"/>
+            <a:ext cx="3118010" cy="1473276"/>
+          </a:xfrm>
+          <a:prstGeom prst="rect">
+            <a:avLst/>
+          </a:prstGeom>
+        </p:spPr>
+      </p:pic>
     </p:spTree>
     <p:extLst>
       <p:ext uri="{BB962C8B-B14F-4D97-AF65-F5344CB8AC3E}">
@@ -5609,17 +6734,120 @@
           <a:lstStyle/>
           <a:p>
             <a:r>
-              <a:rPr lang="ko-KR" altLang="en-US" sz="1600" dirty="0"/>
+              <a:rPr lang="ko-KR" altLang="en-US" sz="1600"/>
               <a:t>슬라이드 </a:t>
             </a:r>
             <a:r>
-              <a:rPr lang="en-US" altLang="ko-KR" sz="1600" dirty="0" smtClean="0"/>
+              <a:rPr lang="en-US" altLang="ko-KR" sz="1600"/>
+              <a:t>15 </a:t>
+            </a:r>
+            <a:r>
+              <a:rPr lang="ko-KR" altLang="en-US" sz="1600"/>
+              <a:t>실습</a:t>
+            </a:r>
+            <a:endParaRPr lang="ko-KR" altLang="en-US" sz="1600" dirty="0"/>
+          </a:p>
+        </p:txBody>
+      </p:sp>
+      <p:pic>
+        <p:nvPicPr>
+          <p:cNvPr id="4" name="그림 3">
+            <a:extLst>
+              <a:ext uri="{FF2B5EF4-FFF2-40B4-BE49-F238E27FC236}">
+                <a16:creationId xmlns:a16="http://schemas.microsoft.com/office/drawing/2014/main" id="{22F59EDD-889A-8EBA-4A4F-9DCA5104A1C2}"/>
+              </a:ext>
+            </a:extLst>
+          </p:cNvPr>
+          <p:cNvPicPr>
+            <a:picLocks noChangeAspect="1"/>
+          </p:cNvPicPr>
+          <p:nvPr/>
+        </p:nvPicPr>
+        <p:blipFill>
+          <a:blip r:embed="rId2"/>
+          <a:stretch>
+            <a:fillRect/>
+          </a:stretch>
+        </p:blipFill>
+        <p:spPr>
+          <a:xfrm>
+            <a:off x="1584244" y="2035148"/>
+            <a:ext cx="4122779" cy="2787704"/>
+          </a:xfrm>
+          <a:prstGeom prst="rect">
+            <a:avLst/>
+          </a:prstGeom>
+        </p:spPr>
+      </p:pic>
+      <p:sp>
+        <p:nvSpPr>
+          <p:cNvPr id="5" name="TextBox 4">
+            <a:extLst>
+              <a:ext uri="{FF2B5EF4-FFF2-40B4-BE49-F238E27FC236}">
+                <a16:creationId xmlns:a16="http://schemas.microsoft.com/office/drawing/2014/main" id="{05D38FFD-CFE2-4F52-69DC-80D2A5EFDB79}"/>
+              </a:ext>
+            </a:extLst>
+          </p:cNvPr>
+          <p:cNvSpPr txBox="1"/>
+          <p:nvPr/>
+        </p:nvSpPr>
+        <p:spPr>
+          <a:xfrm>
+            <a:off x="6769639" y="2967335"/>
+            <a:ext cx="3838117" cy="923330"/>
+          </a:xfrm>
+          <a:prstGeom prst="rect">
+            <a:avLst/>
+          </a:prstGeom>
+          <a:noFill/>
+        </p:spPr>
+        <p:txBody>
+          <a:bodyPr wrap="square" rtlCol="0">
+            <a:spAutoFit/>
+          </a:bodyPr>
+          <a:lstStyle/>
+          <a:p>
+            <a:r>
+              <a:rPr lang="ko-KR" altLang="en-US" dirty="0"/>
+              <a:t>발생한 이벤트의 타입</a:t>
+            </a:r>
+            <a:r>
+              <a:rPr lang="en-US" altLang="ko-KR" dirty="0"/>
+              <a:t>, </a:t>
+            </a:r>
+            <a:r>
+              <a:rPr lang="ko-KR" altLang="en-US" dirty="0"/>
+              <a:t>객체</a:t>
+            </a:r>
+            <a:r>
+              <a:rPr lang="en-US" altLang="ko-KR" dirty="0"/>
+              <a:t>, </a:t>
+            </a:r>
+            <a:r>
+              <a:rPr lang="en-US" altLang="ko-KR" dirty="0" err="1"/>
+              <a:t>currentTarget</a:t>
+            </a:r>
+            <a:r>
+              <a:rPr lang="en-US" altLang="ko-KR" dirty="0"/>
+              <a:t>, </a:t>
+            </a:r>
+            <a:r>
+              <a:rPr lang="en-US" altLang="ko-KR" dirty="0" err="1"/>
+              <a:t>defaultPrevented</a:t>
+            </a:r>
+            <a:r>
+              <a:rPr lang="en-US" altLang="ko-KR" dirty="0"/>
               <a:t> </a:t>
             </a:r>
             <a:r>
-              <a:rPr lang="ko-KR" altLang="en-US" sz="1600" dirty="0"/>
-              <a:t>실습</a:t>
-            </a:r>
+              <a:rPr lang="ko-KR" altLang="en-US" dirty="0"/>
+              <a:t>를 출력한다</a:t>
+            </a:r>
+            <a:r>
+              <a:rPr lang="en-US" altLang="ko-KR" dirty="0"/>
+              <a:t>.</a:t>
+            </a:r>
+            <a:endParaRPr lang="ko-KR" altLang="en-US" dirty="0"/>
           </a:p>
         </p:txBody>
       </p:sp>

</xml_diff>